<commit_message>
Work on encoder concept
</commit_message>
<xml_diff>
--- a/ml/concepts/message_passing_algorithm.pptx
+++ b/ml/concepts/message_passing_algorithm.pptx
@@ -5,7 +5,9 @@
     <p:sldMasterId id="2147483648" r:id="rId1"/>
   </p:sldMasterIdLst>
   <p:sldIdLst>
-    <p:sldId id="256" r:id="rId2"/>
+    <p:sldId id="259" r:id="rId2"/>
+    <p:sldId id="257" r:id="rId3"/>
+    <p:sldId id="260" r:id="rId4"/>
   </p:sldIdLst>
   <p:sldSz cx="12192000" cy="6858000"/>
   <p:notesSz cx="6858000" cy="9144000"/>
@@ -104,6 +106,11 @@
       </a:defRPr>
     </a:lvl9pPr>
   </p:defaultTextStyle>
+  <p:extLst>
+    <p:ext uri="{EFAFB233-063F-42B5-8137-9DF3F51BA10A}">
+      <p15:sldGuideLst xmlns:p15="http://schemas.microsoft.com/office/powerpoint/2012/main"/>
+    </p:ext>
+  </p:extLst>
 </p:presentation>
 </file>
 
@@ -254,7 +261,7 @@
           <a:p>
             <a:fld id="{756BBC9F-7144-48E7-A142-9FBF2D92A77D}" type="datetimeFigureOut">
               <a:rPr lang="en-US" smtClean="0"/>
-              <a:t>9/19/2023</a:t>
+              <a:t>1/24/2024</a:t>
             </a:fld>
             <a:endParaRPr lang="en-US"/>
           </a:p>
@@ -452,7 +459,7 @@
           <a:p>
             <a:fld id="{756BBC9F-7144-48E7-A142-9FBF2D92A77D}" type="datetimeFigureOut">
               <a:rPr lang="en-US" smtClean="0"/>
-              <a:t>9/19/2023</a:t>
+              <a:t>1/24/2024</a:t>
             </a:fld>
             <a:endParaRPr lang="en-US"/>
           </a:p>
@@ -660,7 +667,7 @@
           <a:p>
             <a:fld id="{756BBC9F-7144-48E7-A142-9FBF2D92A77D}" type="datetimeFigureOut">
               <a:rPr lang="en-US" smtClean="0"/>
-              <a:t>9/19/2023</a:t>
+              <a:t>1/24/2024</a:t>
             </a:fld>
             <a:endParaRPr lang="en-US"/>
           </a:p>
@@ -858,7 +865,7 @@
           <a:p>
             <a:fld id="{756BBC9F-7144-48E7-A142-9FBF2D92A77D}" type="datetimeFigureOut">
               <a:rPr lang="en-US" smtClean="0"/>
-              <a:t>9/19/2023</a:t>
+              <a:t>1/24/2024</a:t>
             </a:fld>
             <a:endParaRPr lang="en-US"/>
           </a:p>
@@ -1133,7 +1140,7 @@
           <a:p>
             <a:fld id="{756BBC9F-7144-48E7-A142-9FBF2D92A77D}" type="datetimeFigureOut">
               <a:rPr lang="en-US" smtClean="0"/>
-              <a:t>9/19/2023</a:t>
+              <a:t>1/24/2024</a:t>
             </a:fld>
             <a:endParaRPr lang="en-US"/>
           </a:p>
@@ -1398,7 +1405,7 @@
           <a:p>
             <a:fld id="{756BBC9F-7144-48E7-A142-9FBF2D92A77D}" type="datetimeFigureOut">
               <a:rPr lang="en-US" smtClean="0"/>
-              <a:t>9/19/2023</a:t>
+              <a:t>1/24/2024</a:t>
             </a:fld>
             <a:endParaRPr lang="en-US"/>
           </a:p>
@@ -1810,7 +1817,7 @@
           <a:p>
             <a:fld id="{756BBC9F-7144-48E7-A142-9FBF2D92A77D}" type="datetimeFigureOut">
               <a:rPr lang="en-US" smtClean="0"/>
-              <a:t>9/19/2023</a:t>
+              <a:t>1/24/2024</a:t>
             </a:fld>
             <a:endParaRPr lang="en-US"/>
           </a:p>
@@ -1951,7 +1958,7 @@
           <a:p>
             <a:fld id="{756BBC9F-7144-48E7-A142-9FBF2D92A77D}" type="datetimeFigureOut">
               <a:rPr lang="en-US" smtClean="0"/>
-              <a:t>9/19/2023</a:t>
+              <a:t>1/24/2024</a:t>
             </a:fld>
             <a:endParaRPr lang="en-US"/>
           </a:p>
@@ -2064,7 +2071,7 @@
           <a:p>
             <a:fld id="{756BBC9F-7144-48E7-A142-9FBF2D92A77D}" type="datetimeFigureOut">
               <a:rPr lang="en-US" smtClean="0"/>
-              <a:t>9/19/2023</a:t>
+              <a:t>1/24/2024</a:t>
             </a:fld>
             <a:endParaRPr lang="en-US"/>
           </a:p>
@@ -2375,7 +2382,7 @@
           <a:p>
             <a:fld id="{756BBC9F-7144-48E7-A142-9FBF2D92A77D}" type="datetimeFigureOut">
               <a:rPr lang="en-US" smtClean="0"/>
-              <a:t>9/19/2023</a:t>
+              <a:t>1/24/2024</a:t>
             </a:fld>
             <a:endParaRPr lang="en-US"/>
           </a:p>
@@ -2663,7 +2670,7 @@
           <a:p>
             <a:fld id="{756BBC9F-7144-48E7-A142-9FBF2D92A77D}" type="datetimeFigureOut">
               <a:rPr lang="en-US" smtClean="0"/>
-              <a:t>9/19/2023</a:t>
+              <a:t>1/24/2024</a:t>
             </a:fld>
             <a:endParaRPr lang="en-US"/>
           </a:p>
@@ -2904,7 +2911,7 @@
           <a:p>
             <a:fld id="{756BBC9F-7144-48E7-A142-9FBF2D92A77D}" type="datetimeFigureOut">
               <a:rPr lang="en-US" smtClean="0"/>
-              <a:t>9/19/2023</a:t>
+              <a:t>1/24/2024</a:t>
             </a:fld>
             <a:endParaRPr lang="en-US"/>
           </a:p>
@@ -3323,10 +3330,97 @@
       </p:grpSpPr>
       <p:sp>
         <p:nvSpPr>
-          <p:cNvPr id="5" name="Oval 4">
-            <a:extLst>
-              <a:ext uri="{FF2B5EF4-FFF2-40B4-BE49-F238E27FC236}">
-                <a16:creationId xmlns:a16="http://schemas.microsoft.com/office/drawing/2014/main" id="{70B91E5F-5CF3-6DCD-DA44-4D46E69A9FA5}"/>
+          <p:cNvPr id="2" name="Title 1">
+            <a:extLst>
+              <a:ext uri="{FF2B5EF4-FFF2-40B4-BE49-F238E27FC236}">
+                <a16:creationId xmlns:a16="http://schemas.microsoft.com/office/drawing/2014/main" id="{0272A585-394F-0659-D6C5-6EE8A2D8AE9A}"/>
+              </a:ext>
+            </a:extLst>
+          </p:cNvPr>
+          <p:cNvSpPr>
+            <a:spLocks noGrp="1"/>
+          </p:cNvSpPr>
+          <p:nvPr>
+            <p:ph type="title"/>
+          </p:nvPr>
+        </p:nvSpPr>
+        <p:spPr>
+          <a:xfrm>
+            <a:off x="838200" y="365125"/>
+            <a:ext cx="7419392" cy="1325563"/>
+          </a:xfrm>
+        </p:spPr>
+        <p:txBody>
+          <a:bodyPr/>
+          <a:lstStyle/>
+          <a:p>
+            <a:r>
+              <a:rPr lang="en-US" dirty="0"/>
+              <a:t>Hierarchical Model - Encoder</a:t>
+            </a:r>
+          </a:p>
+        </p:txBody>
+      </p:sp>
+      <p:sp>
+        <p:nvSpPr>
+          <p:cNvPr id="62" name="TextBox 61">
+            <a:extLst>
+              <a:ext uri="{FF2B5EF4-FFF2-40B4-BE49-F238E27FC236}">
+                <a16:creationId xmlns:a16="http://schemas.microsoft.com/office/drawing/2014/main" id="{4AB1B6C1-C9FF-EE73-0F26-EC7DB754304A}"/>
+              </a:ext>
+            </a:extLst>
+          </p:cNvPr>
+          <p:cNvSpPr txBox="1"/>
+          <p:nvPr/>
+        </p:nvSpPr>
+        <p:spPr>
+          <a:xfrm>
+            <a:off x="9196557" y="1481737"/>
+            <a:ext cx="2167345" cy="600164"/>
+          </a:xfrm>
+          <a:prstGeom prst="rect">
+            <a:avLst/>
+          </a:prstGeom>
+          <a:noFill/>
+        </p:spPr>
+        <p:txBody>
+          <a:bodyPr wrap="square">
+            <a:spAutoFit/>
+          </a:bodyPr>
+          <a:lstStyle/>
+          <a:p>
+            <a:pPr algn="l"/>
+            <a:r>
+              <a:rPr lang="en-US" sz="1100" b="1" i="0" dirty="0">
+                <a:solidFill>
+                  <a:srgbClr val="000000"/>
+                </a:solidFill>
+                <a:effectLst/>
+                <a:latin typeface="Lucida Grande"/>
+              </a:rPr>
+              <a:t>Position-aware Graph Neural Networks</a:t>
+            </a:r>
+            <a:endParaRPr lang="en-US" sz="1100" dirty="0">
+              <a:hlinkClick r:id="rId2"/>
+            </a:endParaRPr>
+          </a:p>
+          <a:p>
+            <a:r>
+              <a:rPr lang="en-US" sz="1100" dirty="0">
+                <a:hlinkClick r:id="rId2"/>
+              </a:rPr>
+              <a:t>https://arxiv.org/abs/1906.04817</a:t>
+            </a:r>
+            <a:endParaRPr lang="en-US" sz="1100" dirty="0"/>
+          </a:p>
+        </p:txBody>
+      </p:sp>
+      <p:sp>
+        <p:nvSpPr>
+          <p:cNvPr id="88" name="Oval 87">
+            <a:extLst>
+              <a:ext uri="{FF2B5EF4-FFF2-40B4-BE49-F238E27FC236}">
+                <a16:creationId xmlns:a16="http://schemas.microsoft.com/office/drawing/2014/main" id="{30003F21-349B-B9A4-254A-63F47FB36C66}"/>
               </a:ext>
             </a:extLst>
           </p:cNvPr>
@@ -3335,8 +3429,8 @@
         </p:nvSpPr>
         <p:spPr>
           <a:xfrm>
-            <a:off x="1595536" y="1251240"/>
-            <a:ext cx="597158" cy="288311"/>
+            <a:off x="5113838" y="5016027"/>
+            <a:ext cx="2620101" cy="737304"/>
           </a:xfrm>
           <a:prstGeom prst="ellipse">
             <a:avLst/>
@@ -3364,32 +3458,276 @@
           <a:p>
             <a:pPr algn="ctr"/>
             <a:r>
-              <a:rPr lang="en-US" sz="800" dirty="0"/>
-              <a:t>node</a:t>
+              <a:rPr lang="en-US" sz="1000" dirty="0"/>
+              <a:t>subgraph including parent clustering node</a:t>
+            </a:r>
+          </a:p>
+        </p:txBody>
+      </p:sp>
+      <p:sp>
+        <p:nvSpPr>
+          <p:cNvPr id="93" name="Oval 92">
+            <a:extLst>
+              <a:ext uri="{FF2B5EF4-FFF2-40B4-BE49-F238E27FC236}">
+                <a16:creationId xmlns:a16="http://schemas.microsoft.com/office/drawing/2014/main" id="{63AF4775-79F1-C91A-DA0D-3513E260635F}"/>
+              </a:ext>
+            </a:extLst>
+          </p:cNvPr>
+          <p:cNvSpPr/>
+          <p:nvPr/>
+        </p:nvSpPr>
+        <p:spPr>
+          <a:xfrm>
+            <a:off x="714375" y="4637398"/>
+            <a:ext cx="323850" cy="316248"/>
+          </a:xfrm>
+          <a:prstGeom prst="ellipse">
+            <a:avLst/>
+          </a:prstGeom>
+        </p:spPr>
+        <p:style>
+          <a:lnRef idx="2">
+            <a:schemeClr val="accent1">
+              <a:shade val="15000"/>
+            </a:schemeClr>
+          </a:lnRef>
+          <a:fillRef idx="1">
+            <a:schemeClr val="accent1"/>
+          </a:fillRef>
+          <a:effectRef idx="0">
+            <a:schemeClr val="accent1"/>
+          </a:effectRef>
+          <a:fontRef idx="minor">
+            <a:schemeClr val="lt1"/>
+          </a:fontRef>
+        </p:style>
+        <p:txBody>
+          <a:bodyPr rtlCol="0" anchor="ctr"/>
+          <a:lstStyle/>
+          <a:p>
+            <a:pPr algn="ctr"/>
+            <a:r>
+              <a:rPr lang="en-US" dirty="0"/>
+              <a:t>n</a:t>
+            </a:r>
+          </a:p>
+        </p:txBody>
+      </p:sp>
+      <p:sp>
+        <p:nvSpPr>
+          <p:cNvPr id="94" name="Oval 93">
+            <a:extLst>
+              <a:ext uri="{FF2B5EF4-FFF2-40B4-BE49-F238E27FC236}">
+                <a16:creationId xmlns:a16="http://schemas.microsoft.com/office/drawing/2014/main" id="{4BC3DEFE-D792-D47E-6E16-4049186C7411}"/>
+              </a:ext>
+            </a:extLst>
+          </p:cNvPr>
+          <p:cNvSpPr/>
+          <p:nvPr/>
+        </p:nvSpPr>
+        <p:spPr>
+          <a:xfrm>
+            <a:off x="2754887" y="3706323"/>
+            <a:ext cx="323850" cy="316248"/>
+          </a:xfrm>
+          <a:prstGeom prst="ellipse">
+            <a:avLst/>
+          </a:prstGeom>
+        </p:spPr>
+        <p:style>
+          <a:lnRef idx="2">
+            <a:schemeClr val="accent1">
+              <a:shade val="15000"/>
+            </a:schemeClr>
+          </a:lnRef>
+          <a:fillRef idx="1">
+            <a:schemeClr val="accent1"/>
+          </a:fillRef>
+          <a:effectRef idx="0">
+            <a:schemeClr val="accent1"/>
+          </a:effectRef>
+          <a:fontRef idx="minor">
+            <a:schemeClr val="lt1"/>
+          </a:fontRef>
+        </p:style>
+        <p:txBody>
+          <a:bodyPr rtlCol="0" anchor="ctr"/>
+          <a:lstStyle/>
+          <a:p>
+            <a:pPr algn="ctr"/>
+            <a:r>
+              <a:rPr lang="en-US" dirty="0"/>
+              <a:t>n</a:t>
+            </a:r>
+          </a:p>
+        </p:txBody>
+      </p:sp>
+      <p:sp>
+        <p:nvSpPr>
+          <p:cNvPr id="95" name="Oval 94">
+            <a:extLst>
+              <a:ext uri="{FF2B5EF4-FFF2-40B4-BE49-F238E27FC236}">
+                <a16:creationId xmlns:a16="http://schemas.microsoft.com/office/drawing/2014/main" id="{9936B5F0-748A-01A9-9877-741DCE07BE4C}"/>
+              </a:ext>
+            </a:extLst>
+          </p:cNvPr>
+          <p:cNvSpPr/>
+          <p:nvPr/>
+        </p:nvSpPr>
+        <p:spPr>
+          <a:xfrm>
+            <a:off x="1378368" y="5303148"/>
+            <a:ext cx="323850" cy="316248"/>
+          </a:xfrm>
+          <a:prstGeom prst="ellipse">
+            <a:avLst/>
+          </a:prstGeom>
+        </p:spPr>
+        <p:style>
+          <a:lnRef idx="2">
+            <a:schemeClr val="accent1">
+              <a:shade val="15000"/>
+            </a:schemeClr>
+          </a:lnRef>
+          <a:fillRef idx="1">
+            <a:schemeClr val="accent1"/>
+          </a:fillRef>
+          <a:effectRef idx="0">
+            <a:schemeClr val="accent1"/>
+          </a:effectRef>
+          <a:fontRef idx="minor">
+            <a:schemeClr val="lt1"/>
+          </a:fontRef>
+        </p:style>
+        <p:txBody>
+          <a:bodyPr rtlCol="0" anchor="ctr"/>
+          <a:lstStyle/>
+          <a:p>
+            <a:pPr algn="ctr"/>
+            <a:r>
+              <a:rPr lang="en-US" dirty="0"/>
+              <a:t>n</a:t>
+            </a:r>
+          </a:p>
+        </p:txBody>
+      </p:sp>
+      <p:sp>
+        <p:nvSpPr>
+          <p:cNvPr id="96" name="Oval 95">
+            <a:extLst>
+              <a:ext uri="{FF2B5EF4-FFF2-40B4-BE49-F238E27FC236}">
+                <a16:creationId xmlns:a16="http://schemas.microsoft.com/office/drawing/2014/main" id="{9E134E71-ED41-45F2-BA18-6B782C407D00}"/>
+              </a:ext>
+            </a:extLst>
+          </p:cNvPr>
+          <p:cNvSpPr/>
+          <p:nvPr/>
+        </p:nvSpPr>
+        <p:spPr>
+          <a:xfrm>
+            <a:off x="2004261" y="4631674"/>
+            <a:ext cx="323850" cy="316248"/>
+          </a:xfrm>
+          <a:prstGeom prst="ellipse">
+            <a:avLst/>
+          </a:prstGeom>
+        </p:spPr>
+        <p:style>
+          <a:lnRef idx="2">
+            <a:schemeClr val="accent1">
+              <a:shade val="15000"/>
+            </a:schemeClr>
+          </a:lnRef>
+          <a:fillRef idx="1">
+            <a:schemeClr val="accent1"/>
+          </a:fillRef>
+          <a:effectRef idx="0">
+            <a:schemeClr val="accent1"/>
+          </a:effectRef>
+          <a:fontRef idx="minor">
+            <a:schemeClr val="lt1"/>
+          </a:fontRef>
+        </p:style>
+        <p:txBody>
+          <a:bodyPr rtlCol="0" anchor="ctr"/>
+          <a:lstStyle/>
+          <a:p>
+            <a:pPr algn="ctr"/>
+            <a:r>
+              <a:rPr lang="en-US" dirty="0"/>
+              <a:t>n</a:t>
+            </a:r>
+          </a:p>
+        </p:txBody>
+      </p:sp>
+      <p:sp>
+        <p:nvSpPr>
+          <p:cNvPr id="97" name="Oval 96">
+            <a:extLst>
+              <a:ext uri="{FF2B5EF4-FFF2-40B4-BE49-F238E27FC236}">
+                <a16:creationId xmlns:a16="http://schemas.microsoft.com/office/drawing/2014/main" id="{958C5D8A-601D-061A-1C51-2635EC5894F0}"/>
+              </a:ext>
+            </a:extLst>
+          </p:cNvPr>
+          <p:cNvSpPr/>
+          <p:nvPr/>
+        </p:nvSpPr>
+        <p:spPr>
+          <a:xfrm>
+            <a:off x="1378368" y="3555354"/>
+            <a:ext cx="323850" cy="316248"/>
+          </a:xfrm>
+          <a:prstGeom prst="ellipse">
+            <a:avLst/>
+          </a:prstGeom>
+        </p:spPr>
+        <p:style>
+          <a:lnRef idx="2">
+            <a:schemeClr val="accent1">
+              <a:shade val="15000"/>
+            </a:schemeClr>
+          </a:lnRef>
+          <a:fillRef idx="1">
+            <a:schemeClr val="accent1"/>
+          </a:fillRef>
+          <a:effectRef idx="0">
+            <a:schemeClr val="accent1"/>
+          </a:effectRef>
+          <a:fontRef idx="minor">
+            <a:schemeClr val="lt1"/>
+          </a:fontRef>
+        </p:style>
+        <p:txBody>
+          <a:bodyPr rtlCol="0" anchor="ctr"/>
+          <a:lstStyle/>
+          <a:p>
+            <a:pPr algn="ctr"/>
+            <a:r>
+              <a:rPr lang="en-US" dirty="0"/>
+              <a:t>n</a:t>
             </a:r>
           </a:p>
         </p:txBody>
       </p:sp>
       <p:cxnSp>
         <p:nvCxnSpPr>
-          <p:cNvPr id="12" name="Straight Arrow Connector 11">
-            <a:extLst>
-              <a:ext uri="{FF2B5EF4-FFF2-40B4-BE49-F238E27FC236}">
-                <a16:creationId xmlns:a16="http://schemas.microsoft.com/office/drawing/2014/main" id="{BA73CBE2-53A5-38CB-31D1-0D7A01123DE5}"/>
+          <p:cNvPr id="99" name="Straight Arrow Connector 98">
+            <a:extLst>
+              <a:ext uri="{FF2B5EF4-FFF2-40B4-BE49-F238E27FC236}">
+                <a16:creationId xmlns:a16="http://schemas.microsoft.com/office/drawing/2014/main" id="{471C9179-9E55-F611-AD28-6CD425A2ABD4}"/>
               </a:ext>
             </a:extLst>
           </p:cNvPr>
           <p:cNvCxnSpPr>
-            <a:cxnSpLocks/>
-            <a:stCxn id="29" idx="6"/>
-            <a:endCxn id="5" idx="1"/>
+            <a:stCxn id="96" idx="1"/>
+            <a:endCxn id="97" idx="5"/>
           </p:cNvCxnSpPr>
           <p:nvPr/>
         </p:nvCxnSpPr>
         <p:spPr>
-          <a:xfrm>
-            <a:off x="1193191" y="527498"/>
-            <a:ext cx="489797" cy="765964"/>
+          <a:xfrm flipH="1" flipV="1">
+            <a:off x="1654791" y="3825289"/>
+            <a:ext cx="396897" cy="852698"/>
           </a:xfrm>
           <a:prstGeom prst="straightConnector1">
             <a:avLst/>
@@ -3415,24 +3753,23 @@
       </p:cxnSp>
       <p:cxnSp>
         <p:nvCxnSpPr>
-          <p:cNvPr id="13" name="Straight Arrow Connector 12">
-            <a:extLst>
-              <a:ext uri="{FF2B5EF4-FFF2-40B4-BE49-F238E27FC236}">
-                <a16:creationId xmlns:a16="http://schemas.microsoft.com/office/drawing/2014/main" id="{746B5485-02FC-789D-5597-8FA645038DEB}"/>
+          <p:cNvPr id="101" name="Straight Arrow Connector 100">
+            <a:extLst>
+              <a:ext uri="{FF2B5EF4-FFF2-40B4-BE49-F238E27FC236}">
+                <a16:creationId xmlns:a16="http://schemas.microsoft.com/office/drawing/2014/main" id="{1614CFD4-7F99-779B-8CE1-C64BD0A90647}"/>
               </a:ext>
             </a:extLst>
           </p:cNvPr>
           <p:cNvCxnSpPr>
-            <a:cxnSpLocks/>
-            <a:stCxn id="30" idx="3"/>
-            <a:endCxn id="5" idx="7"/>
+            <a:stCxn id="93" idx="7"/>
+            <a:endCxn id="97" idx="3"/>
           </p:cNvCxnSpPr>
           <p:nvPr/>
         </p:nvCxnSpPr>
         <p:spPr>
-          <a:xfrm flipH="1">
-            <a:off x="2105242" y="775995"/>
-            <a:ext cx="557675" cy="517467"/>
+          <a:xfrm flipV="1">
+            <a:off x="990798" y="3825289"/>
+            <a:ext cx="434997" cy="858422"/>
           </a:xfrm>
           <a:prstGeom prst="straightConnector1">
             <a:avLst/>
@@ -3458,24 +3795,23 @@
       </p:cxnSp>
       <p:cxnSp>
         <p:nvCxnSpPr>
-          <p:cNvPr id="16" name="Straight Arrow Connector 15">
-            <a:extLst>
-              <a:ext uri="{FF2B5EF4-FFF2-40B4-BE49-F238E27FC236}">
-                <a16:creationId xmlns:a16="http://schemas.microsoft.com/office/drawing/2014/main" id="{B60D5809-D498-1575-BD79-24EEA91E5655}"/>
+          <p:cNvPr id="103" name="Straight Arrow Connector 102">
+            <a:extLst>
+              <a:ext uri="{FF2B5EF4-FFF2-40B4-BE49-F238E27FC236}">
+                <a16:creationId xmlns:a16="http://schemas.microsoft.com/office/drawing/2014/main" id="{BC131A02-832A-5FCE-ADDA-835E0A19B751}"/>
               </a:ext>
             </a:extLst>
           </p:cNvPr>
           <p:cNvCxnSpPr>
-            <a:cxnSpLocks/>
-            <a:stCxn id="5" idx="3"/>
-            <a:endCxn id="33" idx="6"/>
+            <a:stCxn id="93" idx="5"/>
+            <a:endCxn id="95" idx="1"/>
           </p:cNvCxnSpPr>
           <p:nvPr/>
         </p:nvCxnSpPr>
         <p:spPr>
-          <a:xfrm flipH="1">
-            <a:off x="1015053" y="1497329"/>
-            <a:ext cx="667935" cy="455881"/>
+          <a:xfrm>
+            <a:off x="990798" y="4907333"/>
+            <a:ext cx="434997" cy="442128"/>
           </a:xfrm>
           <a:prstGeom prst="straightConnector1">
             <a:avLst/>
@@ -3501,24 +3837,114 @@
       </p:cxnSp>
       <p:cxnSp>
         <p:nvCxnSpPr>
-          <p:cNvPr id="19" name="Straight Arrow Connector 18">
-            <a:extLst>
-              <a:ext uri="{FF2B5EF4-FFF2-40B4-BE49-F238E27FC236}">
-                <a16:creationId xmlns:a16="http://schemas.microsoft.com/office/drawing/2014/main" id="{F3952CE3-D881-B3AB-9D9E-BE04636D557D}"/>
+          <p:cNvPr id="105" name="Straight Arrow Connector 104">
+            <a:extLst>
+              <a:ext uri="{FF2B5EF4-FFF2-40B4-BE49-F238E27FC236}">
+                <a16:creationId xmlns:a16="http://schemas.microsoft.com/office/drawing/2014/main" id="{2E05382D-8682-25F2-3CDB-A1533FBC5B7F}"/>
               </a:ext>
             </a:extLst>
           </p:cNvPr>
           <p:cNvCxnSpPr>
-            <a:cxnSpLocks/>
-            <a:stCxn id="5" idx="5"/>
-            <a:endCxn id="32" idx="0"/>
+            <a:stCxn id="95" idx="7"/>
+            <a:endCxn id="96" idx="3"/>
           </p:cNvCxnSpPr>
           <p:nvPr/>
         </p:nvCxnSpPr>
         <p:spPr>
-          <a:xfrm>
-            <a:off x="2105242" y="1497329"/>
-            <a:ext cx="50557" cy="455881"/>
+          <a:xfrm flipV="1">
+            <a:off x="1654791" y="4901609"/>
+            <a:ext cx="396897" cy="447852"/>
+          </a:xfrm>
+          <a:prstGeom prst="straightConnector1">
+            <a:avLst/>
+          </a:prstGeom>
+          <a:ln>
+            <a:tailEnd type="triangle"/>
+          </a:ln>
+        </p:spPr>
+        <p:style>
+          <a:lnRef idx="1">
+            <a:schemeClr val="accent1"/>
+          </a:lnRef>
+          <a:fillRef idx="0">
+            <a:schemeClr val="accent1"/>
+          </a:fillRef>
+          <a:effectRef idx="0">
+            <a:schemeClr val="accent1"/>
+          </a:effectRef>
+          <a:fontRef idx="minor">
+            <a:schemeClr val="tx1"/>
+          </a:fontRef>
+        </p:style>
+      </p:cxnSp>
+      <p:sp>
+        <p:nvSpPr>
+          <p:cNvPr id="106" name="Oval 105">
+            <a:extLst>
+              <a:ext uri="{FF2B5EF4-FFF2-40B4-BE49-F238E27FC236}">
+                <a16:creationId xmlns:a16="http://schemas.microsoft.com/office/drawing/2014/main" id="{C994457A-2762-1600-7D3F-C125CD315729}"/>
+              </a:ext>
+            </a:extLst>
+          </p:cNvPr>
+          <p:cNvSpPr/>
+          <p:nvPr/>
+        </p:nvSpPr>
+        <p:spPr>
+          <a:xfrm>
+            <a:off x="2003630" y="2218994"/>
+            <a:ext cx="323850" cy="316248"/>
+          </a:xfrm>
+          <a:prstGeom prst="ellipse">
+            <a:avLst/>
+          </a:prstGeom>
+        </p:spPr>
+        <p:style>
+          <a:lnRef idx="2">
+            <a:schemeClr val="accent1">
+              <a:shade val="15000"/>
+            </a:schemeClr>
+          </a:lnRef>
+          <a:fillRef idx="1">
+            <a:schemeClr val="accent1"/>
+          </a:fillRef>
+          <a:effectRef idx="0">
+            <a:schemeClr val="accent1"/>
+          </a:effectRef>
+          <a:fontRef idx="minor">
+            <a:schemeClr val="lt1"/>
+          </a:fontRef>
+        </p:style>
+        <p:txBody>
+          <a:bodyPr rtlCol="0" anchor="ctr"/>
+          <a:lstStyle/>
+          <a:p>
+            <a:pPr algn="ctr"/>
+            <a:r>
+              <a:rPr lang="en-US" dirty="0"/>
+              <a:t>r</a:t>
+            </a:r>
+          </a:p>
+        </p:txBody>
+      </p:sp>
+      <p:cxnSp>
+        <p:nvCxnSpPr>
+          <p:cNvPr id="108" name="Straight Arrow Connector 107">
+            <a:extLst>
+              <a:ext uri="{FF2B5EF4-FFF2-40B4-BE49-F238E27FC236}">
+                <a16:creationId xmlns:a16="http://schemas.microsoft.com/office/drawing/2014/main" id="{3A123BD7-5AF9-2A45-6191-45CEC27F6930}"/>
+              </a:ext>
+            </a:extLst>
+          </p:cNvPr>
+          <p:cNvCxnSpPr>
+            <a:stCxn id="97" idx="7"/>
+            <a:endCxn id="106" idx="3"/>
+          </p:cNvCxnSpPr>
+          <p:nvPr/>
+        </p:nvCxnSpPr>
+        <p:spPr>
+          <a:xfrm flipV="1">
+            <a:off x="1654791" y="2488929"/>
+            <a:ext cx="396266" cy="1112738"/>
           </a:xfrm>
           <a:prstGeom prst="straightConnector1">
             <a:avLst/>
@@ -3544,24 +3970,23 @@
       </p:cxnSp>
       <p:cxnSp>
         <p:nvCxnSpPr>
-          <p:cNvPr id="23" name="Straight Arrow Connector 22">
-            <a:extLst>
-              <a:ext uri="{FF2B5EF4-FFF2-40B4-BE49-F238E27FC236}">
-                <a16:creationId xmlns:a16="http://schemas.microsoft.com/office/drawing/2014/main" id="{33DDF872-0519-D53F-DB27-0C2E14A7159B}"/>
+          <p:cNvPr id="110" name="Straight Arrow Connector 109">
+            <a:extLst>
+              <a:ext uri="{FF2B5EF4-FFF2-40B4-BE49-F238E27FC236}">
+                <a16:creationId xmlns:a16="http://schemas.microsoft.com/office/drawing/2014/main" id="{2C299DE4-3CB9-3705-069A-5D0074CF340C}"/>
               </a:ext>
             </a:extLst>
           </p:cNvPr>
           <p:cNvCxnSpPr>
-            <a:cxnSpLocks/>
-            <a:stCxn id="31" idx="2"/>
-            <a:endCxn id="5" idx="6"/>
+            <a:stCxn id="94" idx="1"/>
+            <a:endCxn id="106" idx="5"/>
           </p:cNvCxnSpPr>
           <p:nvPr/>
         </p:nvCxnSpPr>
         <p:spPr>
-          <a:xfrm flipH="1">
-            <a:off x="2192694" y="1381869"/>
-            <a:ext cx="603455" cy="13527"/>
+          <a:xfrm flipH="1" flipV="1">
+            <a:off x="2280053" y="2488929"/>
+            <a:ext cx="522261" cy="1263707"/>
           </a:xfrm>
           <a:prstGeom prst="straightConnector1">
             <a:avLst/>
@@ -3587,10 +4012,256 @@
       </p:cxnSp>
       <p:sp>
         <p:nvSpPr>
-          <p:cNvPr id="29" name="Oval 28">
-            <a:extLst>
-              <a:ext uri="{FF2B5EF4-FFF2-40B4-BE49-F238E27FC236}">
-                <a16:creationId xmlns:a16="http://schemas.microsoft.com/office/drawing/2014/main" id="{4DEA2315-6F54-AFD1-8615-B3438F99B57D}"/>
+          <p:cNvPr id="112" name="TextBox 111">
+            <a:extLst>
+              <a:ext uri="{FF2B5EF4-FFF2-40B4-BE49-F238E27FC236}">
+                <a16:creationId xmlns:a16="http://schemas.microsoft.com/office/drawing/2014/main" id="{D3269FF5-82EB-091E-7B3F-0274B335B1F9}"/>
+              </a:ext>
+            </a:extLst>
+          </p:cNvPr>
+          <p:cNvSpPr txBox="1"/>
+          <p:nvPr/>
+        </p:nvSpPr>
+        <p:spPr>
+          <a:xfrm>
+            <a:off x="375927" y="3118941"/>
+            <a:ext cx="1151329" cy="1200329"/>
+          </a:xfrm>
+          <a:prstGeom prst="rect">
+            <a:avLst/>
+          </a:prstGeom>
+          <a:noFill/>
+        </p:spPr>
+        <p:txBody>
+          <a:bodyPr wrap="square" rtlCol="0">
+            <a:spAutoFit/>
+          </a:bodyPr>
+          <a:lstStyle/>
+          <a:p>
+            <a:r>
+              <a:rPr lang="en-US" dirty="0"/>
+              <a:t>clustering</a:t>
+            </a:r>
+          </a:p>
+          <a:p>
+            <a:r>
+              <a:rPr lang="en-US" dirty="0"/>
+              <a:t>node (base anchor)</a:t>
+            </a:r>
+          </a:p>
+        </p:txBody>
+      </p:sp>
+      <p:sp>
+        <p:nvSpPr>
+          <p:cNvPr id="113" name="TextBox 112">
+            <a:extLst>
+              <a:ext uri="{FF2B5EF4-FFF2-40B4-BE49-F238E27FC236}">
+                <a16:creationId xmlns:a16="http://schemas.microsoft.com/office/drawing/2014/main" id="{21153777-332B-7C0B-2A30-052F25683F9D}"/>
+              </a:ext>
+            </a:extLst>
+          </p:cNvPr>
+          <p:cNvSpPr txBox="1"/>
+          <p:nvPr/>
+        </p:nvSpPr>
+        <p:spPr>
+          <a:xfrm>
+            <a:off x="2341147" y="1629558"/>
+            <a:ext cx="1151329" cy="923330"/>
+          </a:xfrm>
+          <a:prstGeom prst="rect">
+            <a:avLst/>
+          </a:prstGeom>
+          <a:noFill/>
+        </p:spPr>
+        <p:txBody>
+          <a:bodyPr wrap="square" rtlCol="0">
+            <a:spAutoFit/>
+          </a:bodyPr>
+          <a:lstStyle/>
+          <a:p>
+            <a:r>
+              <a:rPr lang="en-US" dirty="0"/>
+              <a:t>root clustering</a:t>
+            </a:r>
+          </a:p>
+          <a:p>
+            <a:r>
+              <a:rPr lang="en-US" dirty="0"/>
+              <a:t>node</a:t>
+            </a:r>
+          </a:p>
+        </p:txBody>
+      </p:sp>
+      <p:sp>
+        <p:nvSpPr>
+          <p:cNvPr id="114" name="TextBox 113">
+            <a:extLst>
+              <a:ext uri="{FF2B5EF4-FFF2-40B4-BE49-F238E27FC236}">
+                <a16:creationId xmlns:a16="http://schemas.microsoft.com/office/drawing/2014/main" id="{77D79AAD-9683-9A44-8442-7DCF825B98DC}"/>
+              </a:ext>
+            </a:extLst>
+          </p:cNvPr>
+          <p:cNvSpPr txBox="1"/>
+          <p:nvPr/>
+        </p:nvSpPr>
+        <p:spPr>
+          <a:xfrm>
+            <a:off x="3144054" y="3573533"/>
+            <a:ext cx="1151329" cy="646331"/>
+          </a:xfrm>
+          <a:prstGeom prst="rect">
+            <a:avLst/>
+          </a:prstGeom>
+          <a:noFill/>
+        </p:spPr>
+        <p:txBody>
+          <a:bodyPr wrap="square" rtlCol="0">
+            <a:spAutoFit/>
+          </a:bodyPr>
+          <a:lstStyle/>
+          <a:p>
+            <a:r>
+              <a:rPr lang="en-US" dirty="0"/>
+              <a:t>leaf</a:t>
+            </a:r>
+          </a:p>
+          <a:p>
+            <a:r>
+              <a:rPr lang="en-US" dirty="0"/>
+              <a:t>node</a:t>
+            </a:r>
+          </a:p>
+        </p:txBody>
+      </p:sp>
+      <p:sp>
+        <p:nvSpPr>
+          <p:cNvPr id="115" name="TextBox 114">
+            <a:extLst>
+              <a:ext uri="{FF2B5EF4-FFF2-40B4-BE49-F238E27FC236}">
+                <a16:creationId xmlns:a16="http://schemas.microsoft.com/office/drawing/2014/main" id="{3021FE79-C970-35F7-013F-159EA66DF1EB}"/>
+              </a:ext>
+            </a:extLst>
+          </p:cNvPr>
+          <p:cNvSpPr txBox="1"/>
+          <p:nvPr/>
+        </p:nvSpPr>
+        <p:spPr>
+          <a:xfrm>
+            <a:off x="2305749" y="4459543"/>
+            <a:ext cx="711976" cy="646331"/>
+          </a:xfrm>
+          <a:prstGeom prst="rect">
+            <a:avLst/>
+          </a:prstGeom>
+          <a:noFill/>
+        </p:spPr>
+        <p:txBody>
+          <a:bodyPr wrap="square" rtlCol="0">
+            <a:spAutoFit/>
+          </a:bodyPr>
+          <a:lstStyle/>
+          <a:p>
+            <a:r>
+              <a:rPr lang="en-US" dirty="0"/>
+              <a:t>leaf</a:t>
+            </a:r>
+          </a:p>
+          <a:p>
+            <a:r>
+              <a:rPr lang="en-US" dirty="0"/>
+              <a:t>node</a:t>
+            </a:r>
+          </a:p>
+        </p:txBody>
+      </p:sp>
+      <p:sp>
+        <p:nvSpPr>
+          <p:cNvPr id="116" name="TextBox 115">
+            <a:extLst>
+              <a:ext uri="{FF2B5EF4-FFF2-40B4-BE49-F238E27FC236}">
+                <a16:creationId xmlns:a16="http://schemas.microsoft.com/office/drawing/2014/main" id="{2BA346CF-9B92-6529-0E97-F2702F9D8ED0}"/>
+              </a:ext>
+            </a:extLst>
+          </p:cNvPr>
+          <p:cNvSpPr txBox="1"/>
+          <p:nvPr/>
+        </p:nvSpPr>
+        <p:spPr>
+          <a:xfrm>
+            <a:off x="1231079" y="5644868"/>
+            <a:ext cx="772551" cy="646331"/>
+          </a:xfrm>
+          <a:prstGeom prst="rect">
+            <a:avLst/>
+          </a:prstGeom>
+          <a:noFill/>
+        </p:spPr>
+        <p:txBody>
+          <a:bodyPr wrap="square" rtlCol="0">
+            <a:spAutoFit/>
+          </a:bodyPr>
+          <a:lstStyle/>
+          <a:p>
+            <a:r>
+              <a:rPr lang="en-US" dirty="0"/>
+              <a:t>leaf</a:t>
+            </a:r>
+          </a:p>
+          <a:p>
+            <a:r>
+              <a:rPr lang="en-US" dirty="0"/>
+              <a:t>node</a:t>
+            </a:r>
+          </a:p>
+        </p:txBody>
+      </p:sp>
+      <p:sp>
+        <p:nvSpPr>
+          <p:cNvPr id="117" name="TextBox 116">
+            <a:extLst>
+              <a:ext uri="{FF2B5EF4-FFF2-40B4-BE49-F238E27FC236}">
+                <a16:creationId xmlns:a16="http://schemas.microsoft.com/office/drawing/2014/main" id="{B9A96ED3-5668-2F55-0934-BAE7D5645298}"/>
+              </a:ext>
+            </a:extLst>
+          </p:cNvPr>
+          <p:cNvSpPr txBox="1"/>
+          <p:nvPr/>
+        </p:nvSpPr>
+        <p:spPr>
+          <a:xfrm>
+            <a:off x="71316" y="4544109"/>
+            <a:ext cx="711976" cy="646331"/>
+          </a:xfrm>
+          <a:prstGeom prst="rect">
+            <a:avLst/>
+          </a:prstGeom>
+          <a:noFill/>
+        </p:spPr>
+        <p:txBody>
+          <a:bodyPr wrap="square" rtlCol="0">
+            <a:spAutoFit/>
+          </a:bodyPr>
+          <a:lstStyle/>
+          <a:p>
+            <a:r>
+              <a:rPr lang="en-US" dirty="0"/>
+              <a:t>leaf</a:t>
+            </a:r>
+          </a:p>
+          <a:p>
+            <a:r>
+              <a:rPr lang="en-US" dirty="0"/>
+              <a:t>node</a:t>
+            </a:r>
+          </a:p>
+        </p:txBody>
+      </p:sp>
+      <p:sp>
+        <p:nvSpPr>
+          <p:cNvPr id="118" name="Rectangle: Rounded Corners 117">
+            <a:extLst>
+              <a:ext uri="{FF2B5EF4-FFF2-40B4-BE49-F238E27FC236}">
+                <a16:creationId xmlns:a16="http://schemas.microsoft.com/office/drawing/2014/main" id="{9E5CB496-4599-5F5E-783A-14FFCAB8F10A}"/>
               </a:ext>
             </a:extLst>
           </p:cNvPr>
@@ -3599,10 +4270,196 @@
         </p:nvSpPr>
         <p:spPr>
           <a:xfrm>
-            <a:off x="408721" y="396869"/>
-            <a:ext cx="784470" cy="261257"/>
-          </a:xfrm>
-          <a:prstGeom prst="ellipse">
+            <a:off x="0" y="4478159"/>
+            <a:ext cx="3017725" cy="1813040"/>
+          </a:xfrm>
+          <a:prstGeom prst="roundRect">
+            <a:avLst/>
+          </a:prstGeom>
+          <a:noFill/>
+          <a:ln w="9525" cap="flat" cmpd="sng" algn="ctr">
+            <a:solidFill>
+              <a:schemeClr val="accent2"/>
+            </a:solidFill>
+            <a:prstDash val="solid"/>
+            <a:round/>
+            <a:headEnd type="none" w="med" len="med"/>
+            <a:tailEnd type="none" w="med" len="med"/>
+          </a:ln>
+        </p:spPr>
+        <p:style>
+          <a:lnRef idx="0">
+            <a:scrgbClr r="0" g="0" b="0"/>
+          </a:lnRef>
+          <a:fillRef idx="0">
+            <a:scrgbClr r="0" g="0" b="0"/>
+          </a:fillRef>
+          <a:effectRef idx="0">
+            <a:scrgbClr r="0" g="0" b="0"/>
+          </a:effectRef>
+          <a:fontRef idx="minor">
+            <a:schemeClr val="accent2"/>
+          </a:fontRef>
+        </p:style>
+        <p:txBody>
+          <a:bodyPr rtlCol="0" anchor="ctr"/>
+          <a:lstStyle/>
+          <a:p>
+            <a:pPr algn="ctr"/>
+            <a:endParaRPr lang="en-US"/>
+          </a:p>
+        </p:txBody>
+      </p:sp>
+      <p:sp>
+        <p:nvSpPr>
+          <p:cNvPr id="119" name="TextBox 118">
+            <a:extLst>
+              <a:ext uri="{FF2B5EF4-FFF2-40B4-BE49-F238E27FC236}">
+                <a16:creationId xmlns:a16="http://schemas.microsoft.com/office/drawing/2014/main" id="{63B42BFE-3529-4C5F-0CE2-328804DCD6BB}"/>
+              </a:ext>
+            </a:extLst>
+          </p:cNvPr>
+          <p:cNvSpPr txBox="1"/>
+          <p:nvPr/>
+        </p:nvSpPr>
+        <p:spPr>
+          <a:xfrm>
+            <a:off x="2045794" y="5956018"/>
+            <a:ext cx="622093" cy="369332"/>
+          </a:xfrm>
+          <a:prstGeom prst="rect">
+            <a:avLst/>
+          </a:prstGeom>
+          <a:noFill/>
+        </p:spPr>
+        <p:txBody>
+          <a:bodyPr wrap="none" rtlCol="0">
+            <a:spAutoFit/>
+          </a:bodyPr>
+          <a:lstStyle/>
+          <a:p>
+            <a:r>
+              <a:rPr lang="en-US" dirty="0">
+                <a:solidFill>
+                  <a:schemeClr val="accent2"/>
+                </a:solidFill>
+              </a:rPr>
+              <a:t>level</a:t>
+            </a:r>
+          </a:p>
+        </p:txBody>
+      </p:sp>
+      <p:sp>
+        <p:nvSpPr>
+          <p:cNvPr id="120" name="Rectangle: Rounded Corners 119">
+            <a:extLst>
+              <a:ext uri="{FF2B5EF4-FFF2-40B4-BE49-F238E27FC236}">
+                <a16:creationId xmlns:a16="http://schemas.microsoft.com/office/drawing/2014/main" id="{AC95B2E0-5D52-9EEA-13CD-4CF394AD40B3}"/>
+              </a:ext>
+            </a:extLst>
+          </p:cNvPr>
+          <p:cNvSpPr/>
+          <p:nvPr/>
+        </p:nvSpPr>
+        <p:spPr>
+          <a:xfrm>
+            <a:off x="383141" y="3013486"/>
+            <a:ext cx="3455434" cy="1343277"/>
+          </a:xfrm>
+          <a:prstGeom prst="roundRect">
+            <a:avLst/>
+          </a:prstGeom>
+          <a:noFill/>
+          <a:ln w="9525" cap="flat" cmpd="sng" algn="ctr">
+            <a:solidFill>
+              <a:schemeClr val="accent2"/>
+            </a:solidFill>
+            <a:prstDash val="solid"/>
+            <a:round/>
+            <a:headEnd type="none" w="med" len="med"/>
+            <a:tailEnd type="none" w="med" len="med"/>
+          </a:ln>
+        </p:spPr>
+        <p:style>
+          <a:lnRef idx="0">
+            <a:scrgbClr r="0" g="0" b="0"/>
+          </a:lnRef>
+          <a:fillRef idx="0">
+            <a:scrgbClr r="0" g="0" b="0"/>
+          </a:fillRef>
+          <a:effectRef idx="0">
+            <a:scrgbClr r="0" g="0" b="0"/>
+          </a:effectRef>
+          <a:fontRef idx="minor">
+            <a:schemeClr val="accent2"/>
+          </a:fontRef>
+        </p:style>
+        <p:txBody>
+          <a:bodyPr rtlCol="0" anchor="ctr"/>
+          <a:lstStyle/>
+          <a:p>
+            <a:pPr algn="ctr"/>
+            <a:endParaRPr lang="en-US"/>
+          </a:p>
+        </p:txBody>
+      </p:sp>
+      <p:sp>
+        <p:nvSpPr>
+          <p:cNvPr id="121" name="TextBox 120">
+            <a:extLst>
+              <a:ext uri="{FF2B5EF4-FFF2-40B4-BE49-F238E27FC236}">
+                <a16:creationId xmlns:a16="http://schemas.microsoft.com/office/drawing/2014/main" id="{F4F65514-F18D-FF5B-9A4F-06DFED2C072B}"/>
+              </a:ext>
+            </a:extLst>
+          </p:cNvPr>
+          <p:cNvSpPr txBox="1"/>
+          <p:nvPr/>
+        </p:nvSpPr>
+        <p:spPr>
+          <a:xfrm>
+            <a:off x="2905328" y="3002799"/>
+            <a:ext cx="666547" cy="369332"/>
+          </a:xfrm>
+          <a:prstGeom prst="rect">
+            <a:avLst/>
+          </a:prstGeom>
+          <a:noFill/>
+        </p:spPr>
+        <p:txBody>
+          <a:bodyPr wrap="square" rtlCol="0">
+            <a:spAutoFit/>
+          </a:bodyPr>
+          <a:lstStyle/>
+          <a:p>
+            <a:r>
+              <a:rPr lang="en-US" dirty="0">
+                <a:solidFill>
+                  <a:schemeClr val="accent2"/>
+                </a:solidFill>
+              </a:rPr>
+              <a:t>level</a:t>
+            </a:r>
+          </a:p>
+        </p:txBody>
+      </p:sp>
+      <p:sp>
+        <p:nvSpPr>
+          <p:cNvPr id="131" name="Rectangle: Rounded Corners 130">
+            <a:extLst>
+              <a:ext uri="{FF2B5EF4-FFF2-40B4-BE49-F238E27FC236}">
+                <a16:creationId xmlns:a16="http://schemas.microsoft.com/office/drawing/2014/main" id="{8D26C579-8B28-3C91-21E2-4F626B51E936}"/>
+              </a:ext>
+            </a:extLst>
+          </p:cNvPr>
+          <p:cNvSpPr/>
+          <p:nvPr/>
+        </p:nvSpPr>
+        <p:spPr>
+          <a:xfrm>
+            <a:off x="4518888" y="3545832"/>
+            <a:ext cx="3810002" cy="323672"/>
+          </a:xfrm>
+          <a:prstGeom prst="roundRect">
             <a:avLst/>
           </a:prstGeom>
         </p:spPr>
@@ -3628,1312 +4485,32 @@
           <a:p>
             <a:pPr algn="ctr"/>
             <a:r>
-              <a:rPr lang="en-US" sz="700" dirty="0"/>
-              <a:t>neighbor</a:t>
-            </a:r>
-            <a:endParaRPr lang="en-US" dirty="0"/>
-          </a:p>
-        </p:txBody>
-      </p:sp>
-      <p:sp>
-        <p:nvSpPr>
-          <p:cNvPr id="30" name="Oval 29">
-            <a:extLst>
-              <a:ext uri="{FF2B5EF4-FFF2-40B4-BE49-F238E27FC236}">
-                <a16:creationId xmlns:a16="http://schemas.microsoft.com/office/drawing/2014/main" id="{7F4424D0-4AE6-2DBD-9A8F-DE308DCA484C}"/>
-              </a:ext>
-            </a:extLst>
-          </p:cNvPr>
-          <p:cNvSpPr/>
-          <p:nvPr/>
-        </p:nvSpPr>
-        <p:spPr>
-          <a:xfrm>
-            <a:off x="2548034" y="552998"/>
-            <a:ext cx="784470" cy="261257"/>
-          </a:xfrm>
-          <a:prstGeom prst="ellipse">
-            <a:avLst/>
-          </a:prstGeom>
-        </p:spPr>
-        <p:style>
-          <a:lnRef idx="2">
-            <a:schemeClr val="accent1">
-              <a:shade val="15000"/>
-            </a:schemeClr>
-          </a:lnRef>
-          <a:fillRef idx="1">
-            <a:schemeClr val="accent1"/>
-          </a:fillRef>
-          <a:effectRef idx="0">
-            <a:schemeClr val="accent1"/>
-          </a:effectRef>
-          <a:fontRef idx="minor">
-            <a:schemeClr val="lt1"/>
-          </a:fontRef>
-        </p:style>
-        <p:txBody>
-          <a:bodyPr rtlCol="0" anchor="ctr"/>
-          <a:lstStyle/>
-          <a:p>
-            <a:pPr algn="ctr"/>
-            <a:r>
-              <a:rPr lang="en-US" sz="700" dirty="0"/>
-              <a:t>neighbor</a:t>
-            </a:r>
-            <a:endParaRPr lang="en-US" dirty="0"/>
-          </a:p>
-        </p:txBody>
-      </p:sp>
-      <p:sp>
-        <p:nvSpPr>
-          <p:cNvPr id="31" name="Oval 30">
-            <a:extLst>
-              <a:ext uri="{FF2B5EF4-FFF2-40B4-BE49-F238E27FC236}">
-                <a16:creationId xmlns:a16="http://schemas.microsoft.com/office/drawing/2014/main" id="{8B3C7336-560D-E766-384C-4DDB2465E191}"/>
-              </a:ext>
-            </a:extLst>
-          </p:cNvPr>
-          <p:cNvSpPr/>
-          <p:nvPr/>
-        </p:nvSpPr>
-        <p:spPr>
-          <a:xfrm>
-            <a:off x="2796149" y="1251240"/>
-            <a:ext cx="784470" cy="261257"/>
-          </a:xfrm>
-          <a:prstGeom prst="ellipse">
-            <a:avLst/>
-          </a:prstGeom>
-        </p:spPr>
-        <p:style>
-          <a:lnRef idx="2">
-            <a:schemeClr val="accent1">
-              <a:shade val="15000"/>
-            </a:schemeClr>
-          </a:lnRef>
-          <a:fillRef idx="1">
-            <a:schemeClr val="accent1"/>
-          </a:fillRef>
-          <a:effectRef idx="0">
-            <a:schemeClr val="accent1"/>
-          </a:effectRef>
-          <a:fontRef idx="minor">
-            <a:schemeClr val="lt1"/>
-          </a:fontRef>
-        </p:style>
-        <p:txBody>
-          <a:bodyPr rtlCol="0" anchor="ctr"/>
-          <a:lstStyle/>
-          <a:p>
-            <a:pPr algn="ctr"/>
-            <a:r>
-              <a:rPr lang="en-US" sz="700" dirty="0"/>
-              <a:t>neighbor</a:t>
-            </a:r>
-            <a:endParaRPr lang="en-US" dirty="0"/>
-          </a:p>
-        </p:txBody>
-      </p:sp>
-      <p:sp>
-        <p:nvSpPr>
-          <p:cNvPr id="32" name="Oval 31">
-            <a:extLst>
-              <a:ext uri="{FF2B5EF4-FFF2-40B4-BE49-F238E27FC236}">
-                <a16:creationId xmlns:a16="http://schemas.microsoft.com/office/drawing/2014/main" id="{4AB3D68C-AC5A-4445-C4D6-758D7B76A058}"/>
-              </a:ext>
-            </a:extLst>
-          </p:cNvPr>
-          <p:cNvSpPr/>
-          <p:nvPr/>
-        </p:nvSpPr>
-        <p:spPr>
-          <a:xfrm>
-            <a:off x="1763564" y="1953210"/>
-            <a:ext cx="784470" cy="261257"/>
-          </a:xfrm>
-          <a:prstGeom prst="ellipse">
-            <a:avLst/>
-          </a:prstGeom>
-        </p:spPr>
-        <p:style>
-          <a:lnRef idx="2">
-            <a:schemeClr val="accent1">
-              <a:shade val="15000"/>
-            </a:schemeClr>
-          </a:lnRef>
-          <a:fillRef idx="1">
-            <a:schemeClr val="accent1"/>
-          </a:fillRef>
-          <a:effectRef idx="0">
-            <a:schemeClr val="accent1"/>
-          </a:effectRef>
-          <a:fontRef idx="minor">
-            <a:schemeClr val="lt1"/>
-          </a:fontRef>
-        </p:style>
-        <p:txBody>
-          <a:bodyPr rtlCol="0" anchor="ctr"/>
-          <a:lstStyle/>
-          <a:p>
-            <a:pPr algn="ctr"/>
-            <a:r>
-              <a:rPr lang="en-US" sz="700" dirty="0"/>
-              <a:t>neighbor</a:t>
-            </a:r>
-            <a:endParaRPr lang="en-US" dirty="0"/>
-          </a:p>
-        </p:txBody>
-      </p:sp>
-      <p:sp>
-        <p:nvSpPr>
-          <p:cNvPr id="33" name="Oval 32">
-            <a:extLst>
-              <a:ext uri="{FF2B5EF4-FFF2-40B4-BE49-F238E27FC236}">
-                <a16:creationId xmlns:a16="http://schemas.microsoft.com/office/drawing/2014/main" id="{BE0DB064-4917-EC73-28CC-B2DBE8702031}"/>
-              </a:ext>
-            </a:extLst>
-          </p:cNvPr>
-          <p:cNvSpPr/>
-          <p:nvPr/>
-        </p:nvSpPr>
-        <p:spPr>
-          <a:xfrm>
-            <a:off x="230583" y="1822581"/>
-            <a:ext cx="784470" cy="261257"/>
-          </a:xfrm>
-          <a:prstGeom prst="ellipse">
-            <a:avLst/>
-          </a:prstGeom>
-        </p:spPr>
-        <p:style>
-          <a:lnRef idx="2">
-            <a:schemeClr val="accent1">
-              <a:shade val="15000"/>
-            </a:schemeClr>
-          </a:lnRef>
-          <a:fillRef idx="1">
-            <a:schemeClr val="accent1"/>
-          </a:fillRef>
-          <a:effectRef idx="0">
-            <a:schemeClr val="accent1"/>
-          </a:effectRef>
-          <a:fontRef idx="minor">
-            <a:schemeClr val="lt1"/>
-          </a:fontRef>
-        </p:style>
-        <p:txBody>
-          <a:bodyPr rtlCol="0" anchor="ctr"/>
-          <a:lstStyle/>
-          <a:p>
-            <a:pPr algn="ctr"/>
-            <a:r>
-              <a:rPr lang="en-US" sz="700" dirty="0"/>
-              <a:t>neighbor</a:t>
-            </a:r>
-            <a:endParaRPr lang="en-US" dirty="0"/>
-          </a:p>
-        </p:txBody>
-      </p:sp>
-      <p:sp>
-        <p:nvSpPr>
-          <p:cNvPr id="54" name="TextBox 53">
-            <a:extLst>
-              <a:ext uri="{FF2B5EF4-FFF2-40B4-BE49-F238E27FC236}">
-                <a16:creationId xmlns:a16="http://schemas.microsoft.com/office/drawing/2014/main" id="{F8F04738-5CEB-87D5-C2F7-DB7B8CF1FA51}"/>
-              </a:ext>
-            </a:extLst>
-          </p:cNvPr>
-          <p:cNvSpPr txBox="1"/>
-          <p:nvPr/>
-        </p:nvSpPr>
-        <p:spPr>
-          <a:xfrm rot="19108592">
-            <a:off x="2088887" y="821268"/>
-            <a:ext cx="489558" cy="276999"/>
-          </a:xfrm>
-          <a:prstGeom prst="rect">
-            <a:avLst/>
-          </a:prstGeom>
-          <a:noFill/>
-        </p:spPr>
-        <p:txBody>
-          <a:bodyPr wrap="none" rtlCol="0">
-            <a:spAutoFit/>
-          </a:bodyPr>
-          <a:lstStyle/>
-          <a:p>
-            <a:r>
-              <a:rPr lang="en-US" sz="1200" dirty="0">
-                <a:solidFill>
-                  <a:srgbClr val="0070C0"/>
-                </a:solidFill>
-              </a:rPr>
-              <a:t>edge</a:t>
-            </a:r>
-          </a:p>
-        </p:txBody>
-      </p:sp>
-      <p:sp>
-        <p:nvSpPr>
-          <p:cNvPr id="56" name="Oval 55">
-            <a:extLst>
-              <a:ext uri="{FF2B5EF4-FFF2-40B4-BE49-F238E27FC236}">
-                <a16:creationId xmlns:a16="http://schemas.microsoft.com/office/drawing/2014/main" id="{1B9CBB1F-B858-B978-0D87-F7B7A5C7B729}"/>
-              </a:ext>
-            </a:extLst>
-          </p:cNvPr>
-          <p:cNvSpPr/>
-          <p:nvPr/>
-        </p:nvSpPr>
-        <p:spPr>
-          <a:xfrm>
-            <a:off x="2616264" y="718927"/>
-            <a:ext cx="93306" cy="105128"/>
-          </a:xfrm>
-          <a:prstGeom prst="ellipse">
-            <a:avLst/>
-          </a:prstGeom>
-          <a:solidFill>
-            <a:schemeClr val="tx1"/>
-          </a:solidFill>
-          <a:ln>
-            <a:solidFill>
-              <a:schemeClr val="tx1"/>
-            </a:solidFill>
-          </a:ln>
-        </p:spPr>
-        <p:style>
-          <a:lnRef idx="2">
-            <a:schemeClr val="accent1">
-              <a:shade val="15000"/>
-            </a:schemeClr>
-          </a:lnRef>
-          <a:fillRef idx="1">
-            <a:schemeClr val="accent1"/>
-          </a:fillRef>
-          <a:effectRef idx="0">
-            <a:schemeClr val="accent1"/>
-          </a:effectRef>
-          <a:fontRef idx="minor">
-            <a:schemeClr val="lt1"/>
-          </a:fontRef>
-        </p:style>
-        <p:txBody>
-          <a:bodyPr rtlCol="0" anchor="ctr"/>
-          <a:lstStyle/>
-          <a:p>
-            <a:pPr algn="ctr"/>
-            <a:endParaRPr lang="en-US"/>
-          </a:p>
-        </p:txBody>
-      </p:sp>
-      <p:sp>
-        <p:nvSpPr>
-          <p:cNvPr id="57" name="Oval 56">
-            <a:extLst>
-              <a:ext uri="{FF2B5EF4-FFF2-40B4-BE49-F238E27FC236}">
-                <a16:creationId xmlns:a16="http://schemas.microsoft.com/office/drawing/2014/main" id="{3019F3AB-D82B-7EFD-C6BE-77C28EF2196B}"/>
-              </a:ext>
-            </a:extLst>
-          </p:cNvPr>
-          <p:cNvSpPr/>
-          <p:nvPr/>
-        </p:nvSpPr>
-        <p:spPr>
-          <a:xfrm>
-            <a:off x="2037214" y="1271748"/>
-            <a:ext cx="93306" cy="105128"/>
-          </a:xfrm>
-          <a:prstGeom prst="ellipse">
-            <a:avLst/>
-          </a:prstGeom>
-          <a:solidFill>
-            <a:schemeClr val="tx1"/>
-          </a:solidFill>
-          <a:ln>
-            <a:solidFill>
-              <a:schemeClr val="tx1"/>
-            </a:solidFill>
-          </a:ln>
-        </p:spPr>
-        <p:style>
-          <a:lnRef idx="2">
-            <a:schemeClr val="accent1">
-              <a:shade val="15000"/>
-            </a:schemeClr>
-          </a:lnRef>
-          <a:fillRef idx="1">
-            <a:schemeClr val="accent1"/>
-          </a:fillRef>
-          <a:effectRef idx="0">
-            <a:schemeClr val="accent1"/>
-          </a:effectRef>
-          <a:fontRef idx="minor">
-            <a:schemeClr val="lt1"/>
-          </a:fontRef>
-        </p:style>
-        <p:txBody>
-          <a:bodyPr rtlCol="0" anchor="ctr"/>
-          <a:lstStyle/>
-          <a:p>
-            <a:pPr algn="ctr"/>
-            <a:endParaRPr lang="en-US"/>
-          </a:p>
-        </p:txBody>
-      </p:sp>
-      <p:sp>
-        <p:nvSpPr>
-          <p:cNvPr id="58" name="Oval 57">
-            <a:extLst>
-              <a:ext uri="{FF2B5EF4-FFF2-40B4-BE49-F238E27FC236}">
-                <a16:creationId xmlns:a16="http://schemas.microsoft.com/office/drawing/2014/main" id="{598B6482-74F8-27A8-ECB8-093D3B8EC4FE}"/>
-              </a:ext>
-            </a:extLst>
-          </p:cNvPr>
-          <p:cNvSpPr/>
-          <p:nvPr/>
-        </p:nvSpPr>
-        <p:spPr>
-          <a:xfrm>
-            <a:off x="2743199" y="1342831"/>
-            <a:ext cx="93306" cy="105128"/>
-          </a:xfrm>
-          <a:prstGeom prst="ellipse">
-            <a:avLst/>
-          </a:prstGeom>
-          <a:solidFill>
-            <a:schemeClr val="tx1"/>
-          </a:solidFill>
-          <a:ln>
-            <a:solidFill>
-              <a:schemeClr val="tx1"/>
-            </a:solidFill>
-          </a:ln>
-        </p:spPr>
-        <p:style>
-          <a:lnRef idx="2">
-            <a:schemeClr val="accent1">
-              <a:shade val="15000"/>
-            </a:schemeClr>
-          </a:lnRef>
-          <a:fillRef idx="1">
-            <a:schemeClr val="accent1"/>
-          </a:fillRef>
-          <a:effectRef idx="0">
-            <a:schemeClr val="accent1"/>
-          </a:effectRef>
-          <a:fontRef idx="minor">
-            <a:schemeClr val="lt1"/>
-          </a:fontRef>
-        </p:style>
-        <p:txBody>
-          <a:bodyPr rtlCol="0" anchor="ctr"/>
-          <a:lstStyle/>
-          <a:p>
-            <a:pPr algn="ctr"/>
-            <a:endParaRPr lang="en-US"/>
-          </a:p>
-        </p:txBody>
-      </p:sp>
-      <p:sp>
-        <p:nvSpPr>
-          <p:cNvPr id="59" name="Oval 58">
-            <a:extLst>
-              <a:ext uri="{FF2B5EF4-FFF2-40B4-BE49-F238E27FC236}">
-                <a16:creationId xmlns:a16="http://schemas.microsoft.com/office/drawing/2014/main" id="{7ED88D6F-18E9-6FCC-DF2D-1154CBF1DEBA}"/>
-              </a:ext>
-            </a:extLst>
-          </p:cNvPr>
-          <p:cNvSpPr/>
-          <p:nvPr/>
-        </p:nvSpPr>
-        <p:spPr>
-          <a:xfrm>
-            <a:off x="2037214" y="1441389"/>
-            <a:ext cx="93306" cy="105128"/>
-          </a:xfrm>
-          <a:prstGeom prst="ellipse">
-            <a:avLst/>
-          </a:prstGeom>
-          <a:solidFill>
-            <a:schemeClr val="tx1"/>
-          </a:solidFill>
-          <a:ln>
-            <a:solidFill>
-              <a:schemeClr val="tx1"/>
-            </a:solidFill>
-          </a:ln>
-        </p:spPr>
-        <p:style>
-          <a:lnRef idx="2">
-            <a:schemeClr val="accent1">
-              <a:shade val="15000"/>
-            </a:schemeClr>
-          </a:lnRef>
-          <a:fillRef idx="1">
-            <a:schemeClr val="accent1"/>
-          </a:fillRef>
-          <a:effectRef idx="0">
-            <a:schemeClr val="accent1"/>
-          </a:effectRef>
-          <a:fontRef idx="minor">
-            <a:schemeClr val="lt1"/>
-          </a:fontRef>
-        </p:style>
-        <p:txBody>
-          <a:bodyPr rtlCol="0" anchor="ctr"/>
-          <a:lstStyle/>
-          <a:p>
-            <a:pPr algn="ctr"/>
-            <a:endParaRPr lang="en-US"/>
-          </a:p>
-        </p:txBody>
-      </p:sp>
-      <p:sp>
-        <p:nvSpPr>
-          <p:cNvPr id="60" name="Oval 59">
-            <a:extLst>
-              <a:ext uri="{FF2B5EF4-FFF2-40B4-BE49-F238E27FC236}">
-                <a16:creationId xmlns:a16="http://schemas.microsoft.com/office/drawing/2014/main" id="{8C5CBC12-8B4A-8C99-DC51-B7022D69EACB}"/>
-              </a:ext>
-            </a:extLst>
-          </p:cNvPr>
-          <p:cNvSpPr/>
-          <p:nvPr/>
-        </p:nvSpPr>
-        <p:spPr>
-          <a:xfrm>
-            <a:off x="2099388" y="1907612"/>
-            <a:ext cx="93306" cy="105128"/>
-          </a:xfrm>
-          <a:prstGeom prst="ellipse">
-            <a:avLst/>
-          </a:prstGeom>
-          <a:solidFill>
-            <a:schemeClr val="tx1"/>
-          </a:solidFill>
-          <a:ln>
-            <a:solidFill>
-              <a:schemeClr val="tx1"/>
-            </a:solidFill>
-          </a:ln>
-        </p:spPr>
-        <p:style>
-          <a:lnRef idx="2">
-            <a:schemeClr val="accent1">
-              <a:shade val="15000"/>
-            </a:schemeClr>
-          </a:lnRef>
-          <a:fillRef idx="1">
-            <a:schemeClr val="accent1"/>
-          </a:fillRef>
-          <a:effectRef idx="0">
-            <a:schemeClr val="accent1"/>
-          </a:effectRef>
-          <a:fontRef idx="minor">
-            <a:schemeClr val="lt1"/>
-          </a:fontRef>
-        </p:style>
-        <p:txBody>
-          <a:bodyPr rtlCol="0" anchor="ctr"/>
-          <a:lstStyle/>
-          <a:p>
-            <a:pPr algn="ctr"/>
-            <a:endParaRPr lang="en-US"/>
-          </a:p>
-        </p:txBody>
-      </p:sp>
-      <p:sp>
-        <p:nvSpPr>
-          <p:cNvPr id="61" name="Oval 60">
-            <a:extLst>
-              <a:ext uri="{FF2B5EF4-FFF2-40B4-BE49-F238E27FC236}">
-                <a16:creationId xmlns:a16="http://schemas.microsoft.com/office/drawing/2014/main" id="{D1A8DB22-A0EA-BAEF-097D-60CECA87979E}"/>
-              </a:ext>
-            </a:extLst>
-          </p:cNvPr>
-          <p:cNvSpPr/>
-          <p:nvPr/>
-        </p:nvSpPr>
-        <p:spPr>
-          <a:xfrm>
-            <a:off x="1607014" y="1459933"/>
-            <a:ext cx="93306" cy="105128"/>
-          </a:xfrm>
-          <a:prstGeom prst="ellipse">
-            <a:avLst/>
-          </a:prstGeom>
-          <a:solidFill>
-            <a:schemeClr val="tx1"/>
-          </a:solidFill>
-          <a:ln>
-            <a:solidFill>
-              <a:schemeClr val="tx1"/>
-            </a:solidFill>
-          </a:ln>
-        </p:spPr>
-        <p:style>
-          <a:lnRef idx="2">
-            <a:schemeClr val="accent1">
-              <a:shade val="15000"/>
-            </a:schemeClr>
-          </a:lnRef>
-          <a:fillRef idx="1">
-            <a:schemeClr val="accent1"/>
-          </a:fillRef>
-          <a:effectRef idx="0">
-            <a:schemeClr val="accent1"/>
-          </a:effectRef>
-          <a:fontRef idx="minor">
-            <a:schemeClr val="lt1"/>
-          </a:fontRef>
-        </p:style>
-        <p:txBody>
-          <a:bodyPr rtlCol="0" anchor="ctr"/>
-          <a:lstStyle/>
-          <a:p>
-            <a:pPr algn="ctr"/>
-            <a:endParaRPr lang="en-US"/>
-          </a:p>
-        </p:txBody>
-      </p:sp>
-      <p:sp>
-        <p:nvSpPr>
-          <p:cNvPr id="62" name="Oval 61">
-            <a:extLst>
-              <a:ext uri="{FF2B5EF4-FFF2-40B4-BE49-F238E27FC236}">
-                <a16:creationId xmlns:a16="http://schemas.microsoft.com/office/drawing/2014/main" id="{7AA45C63-693F-F9A6-E68B-B673D3125172}"/>
-              </a:ext>
-            </a:extLst>
-          </p:cNvPr>
-          <p:cNvSpPr/>
-          <p:nvPr/>
-        </p:nvSpPr>
-        <p:spPr>
-          <a:xfrm>
-            <a:off x="1141928" y="489976"/>
-            <a:ext cx="93306" cy="105128"/>
-          </a:xfrm>
-          <a:prstGeom prst="ellipse">
-            <a:avLst/>
-          </a:prstGeom>
-          <a:solidFill>
-            <a:schemeClr val="tx1"/>
-          </a:solidFill>
-          <a:ln>
-            <a:solidFill>
-              <a:schemeClr val="tx1"/>
-            </a:solidFill>
-          </a:ln>
-        </p:spPr>
-        <p:style>
-          <a:lnRef idx="2">
-            <a:schemeClr val="accent1">
-              <a:shade val="15000"/>
-            </a:schemeClr>
-          </a:lnRef>
-          <a:fillRef idx="1">
-            <a:schemeClr val="accent1"/>
-          </a:fillRef>
-          <a:effectRef idx="0">
-            <a:schemeClr val="accent1"/>
-          </a:effectRef>
-          <a:fontRef idx="minor">
-            <a:schemeClr val="lt1"/>
-          </a:fontRef>
-        </p:style>
-        <p:txBody>
-          <a:bodyPr rtlCol="0" anchor="ctr"/>
-          <a:lstStyle/>
-          <a:p>
-            <a:pPr algn="ctr"/>
-            <a:endParaRPr lang="en-US"/>
-          </a:p>
-        </p:txBody>
-      </p:sp>
-      <p:sp>
-        <p:nvSpPr>
-          <p:cNvPr id="63" name="Oval 62">
-            <a:extLst>
-              <a:ext uri="{FF2B5EF4-FFF2-40B4-BE49-F238E27FC236}">
-                <a16:creationId xmlns:a16="http://schemas.microsoft.com/office/drawing/2014/main" id="{9F89FE4C-01E8-F24A-9787-BD61A1D9A247}"/>
-              </a:ext>
-            </a:extLst>
-          </p:cNvPr>
-          <p:cNvSpPr/>
-          <p:nvPr/>
-        </p:nvSpPr>
-        <p:spPr>
-          <a:xfrm>
-            <a:off x="1649702" y="1251546"/>
-            <a:ext cx="93306" cy="105128"/>
-          </a:xfrm>
-          <a:prstGeom prst="ellipse">
-            <a:avLst/>
-          </a:prstGeom>
-          <a:solidFill>
-            <a:schemeClr val="tx1"/>
-          </a:solidFill>
-          <a:ln>
-            <a:solidFill>
-              <a:schemeClr val="tx1"/>
-            </a:solidFill>
-          </a:ln>
-        </p:spPr>
-        <p:style>
-          <a:lnRef idx="2">
-            <a:schemeClr val="accent1">
-              <a:shade val="15000"/>
-            </a:schemeClr>
-          </a:lnRef>
-          <a:fillRef idx="1">
-            <a:schemeClr val="accent1"/>
-          </a:fillRef>
-          <a:effectRef idx="0">
-            <a:schemeClr val="accent1"/>
-          </a:effectRef>
-          <a:fontRef idx="minor">
-            <a:schemeClr val="lt1"/>
-          </a:fontRef>
-        </p:style>
-        <p:txBody>
-          <a:bodyPr rtlCol="0" anchor="ctr"/>
-          <a:lstStyle/>
-          <a:p>
-            <a:pPr algn="ctr"/>
-            <a:endParaRPr lang="en-US"/>
-          </a:p>
-        </p:txBody>
-      </p:sp>
-      <p:sp>
-        <p:nvSpPr>
-          <p:cNvPr id="64" name="Oval 63">
-            <a:extLst>
-              <a:ext uri="{FF2B5EF4-FFF2-40B4-BE49-F238E27FC236}">
-                <a16:creationId xmlns:a16="http://schemas.microsoft.com/office/drawing/2014/main" id="{6318226A-2E08-D37C-004D-13A5ED31CC21}"/>
-              </a:ext>
-            </a:extLst>
-          </p:cNvPr>
-          <p:cNvSpPr/>
-          <p:nvPr/>
-        </p:nvSpPr>
-        <p:spPr>
-          <a:xfrm>
-            <a:off x="939842" y="1897585"/>
-            <a:ext cx="93306" cy="105128"/>
-          </a:xfrm>
-          <a:prstGeom prst="ellipse">
-            <a:avLst/>
-          </a:prstGeom>
-          <a:solidFill>
-            <a:schemeClr val="tx1"/>
-          </a:solidFill>
-          <a:ln>
-            <a:solidFill>
-              <a:schemeClr val="tx1"/>
-            </a:solidFill>
-          </a:ln>
-        </p:spPr>
-        <p:style>
-          <a:lnRef idx="2">
-            <a:schemeClr val="accent1">
-              <a:shade val="15000"/>
-            </a:schemeClr>
-          </a:lnRef>
-          <a:fillRef idx="1">
-            <a:schemeClr val="accent1"/>
-          </a:fillRef>
-          <a:effectRef idx="0">
-            <a:schemeClr val="accent1"/>
-          </a:effectRef>
-          <a:fontRef idx="minor">
-            <a:schemeClr val="lt1"/>
-          </a:fontRef>
-        </p:style>
-        <p:txBody>
-          <a:bodyPr rtlCol="0" anchor="ctr"/>
-          <a:lstStyle/>
-          <a:p>
-            <a:pPr algn="ctr"/>
-            <a:endParaRPr lang="en-US"/>
-          </a:p>
-        </p:txBody>
-      </p:sp>
-      <p:sp>
-        <p:nvSpPr>
-          <p:cNvPr id="65" name="TextBox 64">
-            <a:extLst>
-              <a:ext uri="{FF2B5EF4-FFF2-40B4-BE49-F238E27FC236}">
-                <a16:creationId xmlns:a16="http://schemas.microsoft.com/office/drawing/2014/main" id="{AA49EF82-DDFB-213B-7F9D-C9ED78A854BB}"/>
-              </a:ext>
-            </a:extLst>
-          </p:cNvPr>
-          <p:cNvSpPr txBox="1"/>
-          <p:nvPr/>
-        </p:nvSpPr>
-        <p:spPr>
-          <a:xfrm>
-            <a:off x="1188581" y="393649"/>
-            <a:ext cx="487011" cy="261610"/>
-          </a:xfrm>
-          <a:prstGeom prst="rect">
-            <a:avLst/>
-          </a:prstGeom>
-          <a:noFill/>
-        </p:spPr>
-        <p:txBody>
-          <a:bodyPr wrap="square" rtlCol="0">
-            <a:spAutoFit/>
-          </a:bodyPr>
-          <a:lstStyle/>
-          <a:p>
-            <a:r>
-              <a:rPr lang="en-US" sz="1100" dirty="0"/>
-              <a:t>port</a:t>
-            </a:r>
-          </a:p>
-        </p:txBody>
-      </p:sp>
-      <p:sp>
-        <p:nvSpPr>
-          <p:cNvPr id="66" name="Oval 65">
-            <a:extLst>
-              <a:ext uri="{FF2B5EF4-FFF2-40B4-BE49-F238E27FC236}">
-                <a16:creationId xmlns:a16="http://schemas.microsoft.com/office/drawing/2014/main" id="{716B99E8-169E-8CC4-7116-57F32FA615DB}"/>
-              </a:ext>
-            </a:extLst>
-          </p:cNvPr>
-          <p:cNvSpPr/>
-          <p:nvPr/>
-        </p:nvSpPr>
-        <p:spPr>
-          <a:xfrm>
-            <a:off x="2126139" y="1359945"/>
-            <a:ext cx="93306" cy="105128"/>
-          </a:xfrm>
-          <a:prstGeom prst="ellipse">
-            <a:avLst/>
-          </a:prstGeom>
-          <a:solidFill>
-            <a:schemeClr val="tx1"/>
-          </a:solidFill>
-          <a:ln>
-            <a:solidFill>
-              <a:schemeClr val="tx1"/>
-            </a:solidFill>
-          </a:ln>
-        </p:spPr>
-        <p:style>
-          <a:lnRef idx="2">
-            <a:schemeClr val="accent1">
-              <a:shade val="15000"/>
-            </a:schemeClr>
-          </a:lnRef>
-          <a:fillRef idx="1">
-            <a:schemeClr val="accent1"/>
-          </a:fillRef>
-          <a:effectRef idx="0">
-            <a:schemeClr val="accent1"/>
-          </a:effectRef>
-          <a:fontRef idx="minor">
-            <a:schemeClr val="lt1"/>
-          </a:fontRef>
-        </p:style>
-        <p:txBody>
-          <a:bodyPr rtlCol="0" anchor="ctr"/>
-          <a:lstStyle/>
-          <a:p>
-            <a:pPr algn="ctr"/>
-            <a:endParaRPr lang="en-US"/>
-          </a:p>
-        </p:txBody>
-      </p:sp>
-      <p:sp>
-        <p:nvSpPr>
-          <p:cNvPr id="67" name="TextBox 66">
-            <a:extLst>
-              <a:ext uri="{FF2B5EF4-FFF2-40B4-BE49-F238E27FC236}">
-                <a16:creationId xmlns:a16="http://schemas.microsoft.com/office/drawing/2014/main" id="{435E8A30-E3DF-E719-4423-C99F59E89B4D}"/>
-              </a:ext>
-            </a:extLst>
-          </p:cNvPr>
-          <p:cNvSpPr txBox="1"/>
-          <p:nvPr/>
-        </p:nvSpPr>
-        <p:spPr>
-          <a:xfrm>
-            <a:off x="4208802" y="1211373"/>
-            <a:ext cx="7781730" cy="2308324"/>
-          </a:xfrm>
-          <a:prstGeom prst="rect">
-            <a:avLst/>
-          </a:prstGeom>
-          <a:noFill/>
-        </p:spPr>
-        <p:txBody>
-          <a:bodyPr wrap="square" rtlCol="0">
-            <a:spAutoFit/>
-          </a:bodyPr>
-          <a:lstStyle/>
-          <a:p>
-            <a:pPr marL="342900" indent="-342900">
-              <a:buAutoNum type="arabicPeriod"/>
-            </a:pPr>
-            <a:r>
               <a:rPr lang="en-US" dirty="0"/>
-              <a:t>Each node, edge and port will be initially encoded by a different MLP.</a:t>
-            </a:r>
-          </a:p>
-          <a:p>
-            <a:pPr marL="342900" indent="-342900">
-              <a:buAutoNum type="arabicPeriod"/>
-            </a:pPr>
-            <a:r>
-              <a:rPr lang="en-US" dirty="0"/>
-              <a:t>Node will aggregate the “message” from each of its neighbors with network shown below. </a:t>
-            </a:r>
-          </a:p>
-          <a:p>
-            <a:pPr marL="342900" indent="-342900">
-              <a:buAutoNum type="arabicPeriod"/>
-            </a:pPr>
-            <a:r>
-              <a:rPr lang="en-US" dirty="0"/>
-              <a:t>Do that for all nodes twice to get the “2-hop” node embeddings.  </a:t>
-            </a:r>
-          </a:p>
-          <a:p>
-            <a:pPr marL="342900" indent="-342900">
-              <a:buAutoNum type="arabicPeriod"/>
-            </a:pPr>
-            <a:r>
-              <a:rPr lang="en-US" dirty="0"/>
-              <a:t>Give those node embeddings to another Transformer to encode the single graph embedding. </a:t>
-            </a:r>
-          </a:p>
-          <a:p>
-            <a:pPr marL="342900" indent="-342900">
-              <a:buAutoNum type="arabicPeriod"/>
-            </a:pPr>
-            <a:r>
-              <a:rPr lang="en-US" dirty="0"/>
-              <a:t>For hierarchical modeling and nodes that behave as a subsystem, aggregate those into a new node that replaces the nodes of the subsystem.</a:t>
-            </a:r>
-          </a:p>
-        </p:txBody>
-      </p:sp>
-      <p:sp>
-        <p:nvSpPr>
-          <p:cNvPr id="68" name="Rectangle 67">
-            <a:extLst>
-              <a:ext uri="{FF2B5EF4-FFF2-40B4-BE49-F238E27FC236}">
-                <a16:creationId xmlns:a16="http://schemas.microsoft.com/office/drawing/2014/main" id="{437ABD5A-4C72-CDF3-481D-22E90A35D469}"/>
-              </a:ext>
-            </a:extLst>
-          </p:cNvPr>
-          <p:cNvSpPr/>
-          <p:nvPr/>
-        </p:nvSpPr>
-        <p:spPr>
-          <a:xfrm>
-            <a:off x="374509" y="3759649"/>
-            <a:ext cx="1612813" cy="976603"/>
-          </a:xfrm>
-          <a:prstGeom prst="rect">
-            <a:avLst/>
-          </a:prstGeom>
-        </p:spPr>
-        <p:style>
-          <a:lnRef idx="2">
-            <a:schemeClr val="accent1">
-              <a:shade val="15000"/>
-            </a:schemeClr>
-          </a:lnRef>
-          <a:fillRef idx="1">
-            <a:schemeClr val="accent1"/>
-          </a:fillRef>
-          <a:effectRef idx="0">
-            <a:schemeClr val="accent1"/>
-          </a:effectRef>
-          <a:fontRef idx="minor">
-            <a:schemeClr val="lt1"/>
-          </a:fontRef>
-        </p:style>
-        <p:txBody>
-          <a:bodyPr rtlCol="0" anchor="ctr"/>
-          <a:lstStyle/>
-          <a:p>
-            <a:r>
-              <a:rPr lang="en-US" sz="1400" b="1" dirty="0"/>
-              <a:t>Concatenate</a:t>
-            </a:r>
-            <a:r>
-              <a:rPr lang="en-US" sz="1400" dirty="0"/>
-              <a:t>:</a:t>
-            </a:r>
-          </a:p>
-          <a:p>
-            <a:pPr marL="285750" indent="-285750">
-              <a:buFont typeface="Arial" panose="020B0604020202020204" pitchFamily="34" charset="0"/>
-              <a:buChar char="•"/>
-            </a:pPr>
-            <a:r>
-              <a:rPr lang="en-US" sz="1400" dirty="0"/>
-              <a:t>Neighbor</a:t>
-            </a:r>
-          </a:p>
-          <a:p>
-            <a:pPr marL="285750" indent="-285750">
-              <a:buFont typeface="Arial" panose="020B0604020202020204" pitchFamily="34" charset="0"/>
-              <a:buChar char="•"/>
-            </a:pPr>
-            <a:r>
-              <a:rPr lang="en-US" sz="1400" dirty="0"/>
-              <a:t>Edge</a:t>
-            </a:r>
-          </a:p>
-          <a:p>
-            <a:pPr marL="285750" indent="-285750">
-              <a:buFont typeface="Arial" panose="020B0604020202020204" pitchFamily="34" charset="0"/>
-              <a:buChar char="•"/>
-            </a:pPr>
-            <a:r>
-              <a:rPr lang="en-US" sz="1400" dirty="0"/>
-              <a:t>Neighbor port</a:t>
-            </a:r>
-          </a:p>
-        </p:txBody>
-      </p:sp>
-      <p:sp>
-        <p:nvSpPr>
-          <p:cNvPr id="69" name="Rectangle 68">
-            <a:extLst>
-              <a:ext uri="{FF2B5EF4-FFF2-40B4-BE49-F238E27FC236}">
-                <a16:creationId xmlns:a16="http://schemas.microsoft.com/office/drawing/2014/main" id="{091766F9-887F-61F3-04BC-087A4BCE8AA4}"/>
-              </a:ext>
-            </a:extLst>
-          </p:cNvPr>
-          <p:cNvSpPr/>
-          <p:nvPr/>
-        </p:nvSpPr>
-        <p:spPr>
-          <a:xfrm>
-            <a:off x="2384943" y="3821695"/>
-            <a:ext cx="947889" cy="852512"/>
-          </a:xfrm>
-          <a:prstGeom prst="rect">
-            <a:avLst/>
-          </a:prstGeom>
-        </p:spPr>
-        <p:style>
-          <a:lnRef idx="2">
-            <a:schemeClr val="accent1">
-              <a:shade val="15000"/>
-            </a:schemeClr>
-          </a:lnRef>
-          <a:fillRef idx="1">
-            <a:schemeClr val="accent1"/>
-          </a:fillRef>
-          <a:effectRef idx="0">
-            <a:schemeClr val="accent1"/>
-          </a:effectRef>
-          <a:fontRef idx="minor">
-            <a:schemeClr val="lt1"/>
-          </a:fontRef>
-        </p:style>
-        <p:txBody>
-          <a:bodyPr rtlCol="0" anchor="ctr"/>
-          <a:lstStyle/>
-          <a:p>
-            <a:r>
-              <a:rPr lang="en-US" sz="1400" b="1" dirty="0"/>
-              <a:t>Negate</a:t>
-            </a:r>
-            <a:r>
-              <a:rPr lang="en-US" sz="1400" dirty="0"/>
-              <a:t> according to edge direction</a:t>
-            </a:r>
-          </a:p>
-        </p:txBody>
-      </p:sp>
-      <p:sp>
-        <p:nvSpPr>
-          <p:cNvPr id="71" name="Rectangle 70">
-            <a:extLst>
-              <a:ext uri="{FF2B5EF4-FFF2-40B4-BE49-F238E27FC236}">
-                <a16:creationId xmlns:a16="http://schemas.microsoft.com/office/drawing/2014/main" id="{CD1D0267-480A-C798-B25B-407FF34C4D27}"/>
-              </a:ext>
-            </a:extLst>
-          </p:cNvPr>
-          <p:cNvSpPr/>
-          <p:nvPr/>
-        </p:nvSpPr>
-        <p:spPr>
-          <a:xfrm>
-            <a:off x="3678925" y="3721739"/>
-            <a:ext cx="1810111" cy="1052424"/>
-          </a:xfrm>
-          <a:prstGeom prst="rect">
-            <a:avLst/>
-          </a:prstGeom>
-        </p:spPr>
-        <p:style>
-          <a:lnRef idx="2">
-            <a:schemeClr val="accent1">
-              <a:shade val="15000"/>
-            </a:schemeClr>
-          </a:lnRef>
-          <a:fillRef idx="1">
-            <a:schemeClr val="accent1"/>
-          </a:fillRef>
-          <a:effectRef idx="0">
-            <a:schemeClr val="accent1"/>
-          </a:effectRef>
-          <a:fontRef idx="minor">
-            <a:schemeClr val="lt1"/>
-          </a:fontRef>
-        </p:style>
-        <p:txBody>
-          <a:bodyPr rtlCol="0" anchor="ctr"/>
-          <a:lstStyle/>
-          <a:p>
-            <a:r>
-              <a:rPr lang="en-US" sz="1400" b="1" dirty="0"/>
-              <a:t>Concatenate</a:t>
-            </a:r>
-            <a:r>
-              <a:rPr lang="en-US" sz="1400" dirty="0"/>
-              <a:t>:</a:t>
-            </a:r>
-          </a:p>
-          <a:p>
-            <a:pPr marL="285750" indent="-285750">
-              <a:buFont typeface="Arial" panose="020B0604020202020204" pitchFamily="34" charset="0"/>
-              <a:buChar char="•"/>
-            </a:pPr>
-            <a:r>
-              <a:rPr lang="en-US" sz="1400" dirty="0"/>
-              <a:t>Neighbor-edge embedding</a:t>
-            </a:r>
-          </a:p>
-          <a:p>
-            <a:pPr marL="285750" indent="-285750">
-              <a:buFont typeface="Arial" panose="020B0604020202020204" pitchFamily="34" charset="0"/>
-              <a:buChar char="•"/>
-            </a:pPr>
-            <a:r>
-              <a:rPr lang="en-US" sz="1400" dirty="0"/>
-              <a:t>Node embedding</a:t>
-            </a:r>
-          </a:p>
-          <a:p>
-            <a:pPr marL="285750" indent="-285750">
-              <a:buFont typeface="Arial" panose="020B0604020202020204" pitchFamily="34" charset="0"/>
-              <a:buChar char="•"/>
-            </a:pPr>
-            <a:r>
-              <a:rPr lang="en-US" sz="1400" dirty="0"/>
-              <a:t>Port embedding</a:t>
-            </a:r>
-          </a:p>
-        </p:txBody>
-      </p:sp>
-      <p:sp>
-        <p:nvSpPr>
-          <p:cNvPr id="72" name="Rectangle 71">
-            <a:extLst>
-              <a:ext uri="{FF2B5EF4-FFF2-40B4-BE49-F238E27FC236}">
-                <a16:creationId xmlns:a16="http://schemas.microsoft.com/office/drawing/2014/main" id="{E80C7B6D-3FE4-E009-0B50-8974E47E1A52}"/>
-              </a:ext>
-            </a:extLst>
-          </p:cNvPr>
-          <p:cNvSpPr/>
-          <p:nvPr/>
-        </p:nvSpPr>
-        <p:spPr>
-          <a:xfrm>
-            <a:off x="8744234" y="4114799"/>
-            <a:ext cx="1140746" cy="296645"/>
-          </a:xfrm>
-          <a:prstGeom prst="rect">
-            <a:avLst/>
-          </a:prstGeom>
-        </p:spPr>
-        <p:style>
-          <a:lnRef idx="2">
-            <a:schemeClr val="accent1">
-              <a:shade val="15000"/>
-            </a:schemeClr>
-          </a:lnRef>
-          <a:fillRef idx="1">
-            <a:schemeClr val="accent1"/>
-          </a:fillRef>
-          <a:effectRef idx="0">
-            <a:schemeClr val="accent1"/>
-          </a:effectRef>
-          <a:fontRef idx="minor">
-            <a:schemeClr val="lt1"/>
-          </a:fontRef>
-        </p:style>
-        <p:txBody>
-          <a:bodyPr rtlCol="0" anchor="ctr"/>
-          <a:lstStyle/>
-          <a:p>
-            <a:r>
-              <a:rPr lang="en-US" sz="1400" b="1" dirty="0"/>
-              <a:t>Transformer</a:t>
-            </a:r>
-            <a:endParaRPr lang="en-US" sz="1400" dirty="0"/>
+              <a:t>Transformer Encoder</a:t>
+            </a:r>
           </a:p>
         </p:txBody>
       </p:sp>
       <p:cxnSp>
         <p:nvCxnSpPr>
-          <p:cNvPr id="75" name="Straight Arrow Connector 74">
-            <a:extLst>
-              <a:ext uri="{FF2B5EF4-FFF2-40B4-BE49-F238E27FC236}">
-                <a16:creationId xmlns:a16="http://schemas.microsoft.com/office/drawing/2014/main" id="{2405BF61-10DF-E484-60E9-D7DF3F3BFEDD}"/>
+          <p:cNvPr id="137" name="Straight Arrow Connector 136">
+            <a:extLst>
+              <a:ext uri="{FF2B5EF4-FFF2-40B4-BE49-F238E27FC236}">
+                <a16:creationId xmlns:a16="http://schemas.microsoft.com/office/drawing/2014/main" id="{59F0B199-1417-534E-BD0A-5C4C96D79C4A}"/>
               </a:ext>
             </a:extLst>
           </p:cNvPr>
           <p:cNvCxnSpPr>
             <a:cxnSpLocks/>
-            <a:stCxn id="72" idx="3"/>
-            <a:endCxn id="76" idx="1"/>
+            <a:stCxn id="3" idx="0"/>
+            <a:endCxn id="131" idx="2"/>
           </p:cNvCxnSpPr>
           <p:nvPr/>
         </p:nvCxnSpPr>
         <p:spPr>
-          <a:xfrm>
-            <a:off x="9884980" y="4263122"/>
-            <a:ext cx="496909" cy="0"/>
-          </a:xfrm>
-          <a:prstGeom prst="straightConnector1">
-            <a:avLst/>
-          </a:prstGeom>
-          <a:ln>
-            <a:tailEnd type="triangle"/>
-          </a:ln>
-        </p:spPr>
-        <p:style>
-          <a:lnRef idx="1">
-            <a:schemeClr val="accent1"/>
-          </a:lnRef>
-          <a:fillRef idx="0">
-            <a:schemeClr val="accent1"/>
-          </a:fillRef>
-          <a:effectRef idx="0">
-            <a:schemeClr val="accent1"/>
-          </a:effectRef>
-          <a:fontRef idx="minor">
-            <a:schemeClr val="tx1"/>
-          </a:fontRef>
-        </p:style>
-      </p:cxnSp>
-      <p:sp>
-        <p:nvSpPr>
-          <p:cNvPr id="76" name="TextBox 75">
-            <a:extLst>
-              <a:ext uri="{FF2B5EF4-FFF2-40B4-BE49-F238E27FC236}">
-                <a16:creationId xmlns:a16="http://schemas.microsoft.com/office/drawing/2014/main" id="{8EE2213D-C061-A24F-2DD2-4EF7422C7EB6}"/>
-              </a:ext>
-            </a:extLst>
-          </p:cNvPr>
-          <p:cNvSpPr txBox="1"/>
-          <p:nvPr/>
-        </p:nvSpPr>
-        <p:spPr>
-          <a:xfrm>
-            <a:off x="10381889" y="4078456"/>
-            <a:ext cx="1810111" cy="369332"/>
-          </a:xfrm>
-          <a:prstGeom prst="rect">
-            <a:avLst/>
-          </a:prstGeom>
-          <a:noFill/>
-        </p:spPr>
-        <p:txBody>
-          <a:bodyPr wrap="none" rtlCol="0">
-            <a:spAutoFit/>
-          </a:bodyPr>
-          <a:lstStyle/>
-          <a:p>
-            <a:r>
-              <a:rPr lang="en-US" dirty="0"/>
-              <a:t>Node embedding</a:t>
-            </a:r>
-          </a:p>
-        </p:txBody>
-      </p:sp>
-      <p:sp>
-        <p:nvSpPr>
-          <p:cNvPr id="82" name="Rectangle 81">
-            <a:extLst>
-              <a:ext uri="{FF2B5EF4-FFF2-40B4-BE49-F238E27FC236}">
-                <a16:creationId xmlns:a16="http://schemas.microsoft.com/office/drawing/2014/main" id="{98AEBA86-819C-C9F8-9F09-2F6CFA1E789E}"/>
-              </a:ext>
-            </a:extLst>
-          </p:cNvPr>
-          <p:cNvSpPr/>
-          <p:nvPr/>
-        </p:nvSpPr>
-        <p:spPr>
-          <a:xfrm>
-            <a:off x="6211579" y="3907682"/>
-            <a:ext cx="1810111" cy="710877"/>
-          </a:xfrm>
-          <a:prstGeom prst="rect">
-            <a:avLst/>
-          </a:prstGeom>
-        </p:spPr>
-        <p:style>
-          <a:lnRef idx="2">
-            <a:schemeClr val="accent1">
-              <a:shade val="15000"/>
-            </a:schemeClr>
-          </a:lnRef>
-          <a:fillRef idx="1">
-            <a:schemeClr val="accent1"/>
-          </a:fillRef>
-          <a:effectRef idx="0">
-            <a:schemeClr val="accent1"/>
-          </a:effectRef>
-          <a:fontRef idx="minor">
-            <a:schemeClr val="lt1"/>
-          </a:fontRef>
-        </p:style>
-        <p:txBody>
-          <a:bodyPr rtlCol="0" anchor="ctr"/>
-          <a:lstStyle/>
-          <a:p>
-            <a:r>
-              <a:rPr lang="en-US" sz="1400" b="1" dirty="0"/>
-              <a:t>Concatenate all neighbor message embeddings</a:t>
-            </a:r>
-            <a:endParaRPr lang="en-US" sz="1400" dirty="0"/>
-          </a:p>
-        </p:txBody>
-      </p:sp>
-      <p:cxnSp>
-        <p:nvCxnSpPr>
-          <p:cNvPr id="84" name="Straight Arrow Connector 83">
-            <a:extLst>
-              <a:ext uri="{FF2B5EF4-FFF2-40B4-BE49-F238E27FC236}">
-                <a16:creationId xmlns:a16="http://schemas.microsoft.com/office/drawing/2014/main" id="{7FA02BC2-4BE5-7B38-3094-C138C6042FB1}"/>
-              </a:ext>
-            </a:extLst>
-          </p:cNvPr>
-          <p:cNvCxnSpPr>
-            <a:stCxn id="68" idx="3"/>
-            <a:endCxn id="69" idx="1"/>
-          </p:cNvCxnSpPr>
-          <p:nvPr/>
-        </p:nvCxnSpPr>
-        <p:spPr>
-          <a:xfrm>
-            <a:off x="1987322" y="4247951"/>
-            <a:ext cx="397621" cy="0"/>
+          <a:xfrm flipV="1">
+            <a:off x="6423889" y="3869504"/>
+            <a:ext cx="0" cy="512769"/>
           </a:xfrm>
           <a:prstGeom prst="straightConnector1">
             <a:avLst/>
@@ -4959,24 +4536,908 @@
       </p:cxnSp>
       <p:cxnSp>
         <p:nvCxnSpPr>
-          <p:cNvPr id="85" name="Straight Arrow Connector 84">
-            <a:extLst>
-              <a:ext uri="{FF2B5EF4-FFF2-40B4-BE49-F238E27FC236}">
-                <a16:creationId xmlns:a16="http://schemas.microsoft.com/office/drawing/2014/main" id="{28F0F3D1-A81D-93CD-385E-A01D0A5EE90E}"/>
+          <p:cNvPr id="139" name="Straight Arrow Connector 138">
+            <a:extLst>
+              <a:ext uri="{FF2B5EF4-FFF2-40B4-BE49-F238E27FC236}">
+                <a16:creationId xmlns:a16="http://schemas.microsoft.com/office/drawing/2014/main" id="{63DB1549-A0A0-DE78-F3F1-6447DE8A5A27}"/>
               </a:ext>
             </a:extLst>
           </p:cNvPr>
           <p:cNvCxnSpPr>
             <a:cxnSpLocks/>
-            <a:stCxn id="69" idx="3"/>
-            <a:endCxn id="71" idx="1"/>
+            <a:stCxn id="131" idx="0"/>
           </p:cNvCxnSpPr>
           <p:nvPr/>
         </p:nvCxnSpPr>
         <p:spPr>
-          <a:xfrm>
-            <a:off x="3332832" y="4247951"/>
-            <a:ext cx="346093" cy="0"/>
+          <a:xfrm flipH="1" flipV="1">
+            <a:off x="6423888" y="1690688"/>
+            <a:ext cx="1" cy="1855144"/>
+          </a:xfrm>
+          <a:prstGeom prst="straightConnector1">
+            <a:avLst/>
+          </a:prstGeom>
+          <a:ln>
+            <a:tailEnd type="triangle"/>
+          </a:ln>
+        </p:spPr>
+        <p:style>
+          <a:lnRef idx="1">
+            <a:schemeClr val="accent1"/>
+          </a:lnRef>
+          <a:fillRef idx="0">
+            <a:schemeClr val="accent1"/>
+          </a:fillRef>
+          <a:effectRef idx="0">
+            <a:schemeClr val="accent1"/>
+          </a:effectRef>
+          <a:fontRef idx="minor">
+            <a:schemeClr val="tx1"/>
+          </a:fontRef>
+        </p:style>
+      </p:cxnSp>
+      <p:sp>
+        <p:nvSpPr>
+          <p:cNvPr id="154" name="TextBox 153">
+            <a:extLst>
+              <a:ext uri="{FF2B5EF4-FFF2-40B4-BE49-F238E27FC236}">
+                <a16:creationId xmlns:a16="http://schemas.microsoft.com/office/drawing/2014/main" id="{E879331B-954E-9DE7-895F-F8424E3AC3A4}"/>
+              </a:ext>
+            </a:extLst>
+          </p:cNvPr>
+          <p:cNvSpPr txBox="1"/>
+          <p:nvPr/>
+        </p:nvSpPr>
+        <p:spPr>
+          <a:xfrm>
+            <a:off x="8972550" y="2314574"/>
+            <a:ext cx="3019423" cy="646331"/>
+          </a:xfrm>
+          <a:prstGeom prst="rect">
+            <a:avLst/>
+          </a:prstGeom>
+          <a:noFill/>
+        </p:spPr>
+        <p:txBody>
+          <a:bodyPr wrap="square" rtlCol="0">
+            <a:spAutoFit/>
+          </a:bodyPr>
+          <a:lstStyle/>
+          <a:p>
+            <a:r>
+              <a:rPr lang="en-US" dirty="0"/>
+              <a:t>Choose 10 nodes, requiring 4 anchor sets.  </a:t>
+            </a:r>
+          </a:p>
+        </p:txBody>
+      </p:sp>
+      <p:sp>
+        <p:nvSpPr>
+          <p:cNvPr id="155" name="TextBox 154">
+            <a:extLst>
+              <a:ext uri="{FF2B5EF4-FFF2-40B4-BE49-F238E27FC236}">
+                <a16:creationId xmlns:a16="http://schemas.microsoft.com/office/drawing/2014/main" id="{36E22D48-2780-175A-0504-A554FC1D6A1E}"/>
+              </a:ext>
+            </a:extLst>
+          </p:cNvPr>
+          <p:cNvSpPr txBox="1"/>
+          <p:nvPr/>
+        </p:nvSpPr>
+        <p:spPr>
+          <a:xfrm>
+            <a:off x="8724901" y="3601665"/>
+            <a:ext cx="2876550" cy="923330"/>
+          </a:xfrm>
+          <a:prstGeom prst="rect">
+            <a:avLst/>
+          </a:prstGeom>
+          <a:noFill/>
+        </p:spPr>
+        <p:txBody>
+          <a:bodyPr wrap="square" rtlCol="0">
+            <a:spAutoFit/>
+          </a:bodyPr>
+          <a:lstStyle/>
+          <a:p>
+            <a:r>
+              <a:rPr lang="en-US" dirty="0"/>
+              <a:t>PGNN is from paper above and on </a:t>
+            </a:r>
+            <a:r>
+              <a:rPr lang="en-US" dirty="0" err="1"/>
+              <a:t>pytorch</a:t>
+            </a:r>
+            <a:r>
+              <a:rPr lang="en-US" dirty="0"/>
+              <a:t> geometric.  It encodes the subgraph</a:t>
+            </a:r>
+          </a:p>
+        </p:txBody>
+      </p:sp>
+      <p:sp>
+        <p:nvSpPr>
+          <p:cNvPr id="3" name="Rectangle: Rounded Corners 2">
+            <a:extLst>
+              <a:ext uri="{FF2B5EF4-FFF2-40B4-BE49-F238E27FC236}">
+                <a16:creationId xmlns:a16="http://schemas.microsoft.com/office/drawing/2014/main" id="{FA5AFF53-E8F2-52A7-834D-5F2D1F958D17}"/>
+              </a:ext>
+            </a:extLst>
+          </p:cNvPr>
+          <p:cNvSpPr/>
+          <p:nvPr/>
+        </p:nvSpPr>
+        <p:spPr>
+          <a:xfrm>
+            <a:off x="4518888" y="4382273"/>
+            <a:ext cx="3810002" cy="323672"/>
+          </a:xfrm>
+          <a:prstGeom prst="roundRect">
+            <a:avLst/>
+          </a:prstGeom>
+        </p:spPr>
+        <p:style>
+          <a:lnRef idx="2">
+            <a:schemeClr val="accent1">
+              <a:shade val="15000"/>
+            </a:schemeClr>
+          </a:lnRef>
+          <a:fillRef idx="1">
+            <a:schemeClr val="accent1"/>
+          </a:fillRef>
+          <a:effectRef idx="0">
+            <a:schemeClr val="accent1"/>
+          </a:effectRef>
+          <a:fontRef idx="minor">
+            <a:schemeClr val="lt1"/>
+          </a:fontRef>
+        </p:style>
+        <p:txBody>
+          <a:bodyPr rtlCol="0" anchor="ctr"/>
+          <a:lstStyle/>
+          <a:p>
+            <a:pPr algn="ctr"/>
+            <a:r>
+              <a:rPr lang="en-US" dirty="0"/>
+              <a:t>PGNN</a:t>
+            </a:r>
+          </a:p>
+        </p:txBody>
+      </p:sp>
+      <p:cxnSp>
+        <p:nvCxnSpPr>
+          <p:cNvPr id="6" name="Straight Arrow Connector 5">
+            <a:extLst>
+              <a:ext uri="{FF2B5EF4-FFF2-40B4-BE49-F238E27FC236}">
+                <a16:creationId xmlns:a16="http://schemas.microsoft.com/office/drawing/2014/main" id="{F064CDD8-F1D0-8673-120A-BBC156A97F6C}"/>
+              </a:ext>
+            </a:extLst>
+          </p:cNvPr>
+          <p:cNvCxnSpPr>
+            <a:cxnSpLocks/>
+            <a:stCxn id="88" idx="0"/>
+            <a:endCxn id="3" idx="2"/>
+          </p:cNvCxnSpPr>
+          <p:nvPr/>
+        </p:nvCxnSpPr>
+        <p:spPr>
+          <a:xfrm flipV="1">
+            <a:off x="6423889" y="4705945"/>
+            <a:ext cx="0" cy="310082"/>
+          </a:xfrm>
+          <a:prstGeom prst="straightConnector1">
+            <a:avLst/>
+          </a:prstGeom>
+          <a:ln>
+            <a:tailEnd type="triangle"/>
+          </a:ln>
+        </p:spPr>
+        <p:style>
+          <a:lnRef idx="1">
+            <a:schemeClr val="accent1"/>
+          </a:lnRef>
+          <a:fillRef idx="0">
+            <a:schemeClr val="accent1"/>
+          </a:fillRef>
+          <a:effectRef idx="0">
+            <a:schemeClr val="accent1"/>
+          </a:effectRef>
+          <a:fontRef idx="minor">
+            <a:schemeClr val="tx1"/>
+          </a:fontRef>
+        </p:style>
+      </p:cxnSp>
+      <p:sp>
+        <p:nvSpPr>
+          <p:cNvPr id="18" name="TextBox 17">
+            <a:extLst>
+              <a:ext uri="{FF2B5EF4-FFF2-40B4-BE49-F238E27FC236}">
+                <a16:creationId xmlns:a16="http://schemas.microsoft.com/office/drawing/2014/main" id="{B124C6D6-0264-9A70-11EB-C8B0F67B4965}"/>
+              </a:ext>
+            </a:extLst>
+          </p:cNvPr>
+          <p:cNvSpPr txBox="1"/>
+          <p:nvPr/>
+        </p:nvSpPr>
+        <p:spPr>
+          <a:xfrm>
+            <a:off x="6414485" y="3053059"/>
+            <a:ext cx="1923809" cy="461665"/>
+          </a:xfrm>
+          <a:prstGeom prst="rect">
+            <a:avLst/>
+          </a:prstGeom>
+          <a:noFill/>
+        </p:spPr>
+        <p:txBody>
+          <a:bodyPr wrap="square" rtlCol="0">
+            <a:spAutoFit/>
+          </a:bodyPr>
+          <a:lstStyle/>
+          <a:p>
+            <a:r>
+              <a:rPr lang="en-US" sz="1200" dirty="0"/>
+              <a:t>Encoded cluster node and child nodes</a:t>
+            </a:r>
+          </a:p>
+        </p:txBody>
+      </p:sp>
+      <p:cxnSp>
+        <p:nvCxnSpPr>
+          <p:cNvPr id="29" name="Connector: Elbow 28">
+            <a:extLst>
+              <a:ext uri="{FF2B5EF4-FFF2-40B4-BE49-F238E27FC236}">
+                <a16:creationId xmlns:a16="http://schemas.microsoft.com/office/drawing/2014/main" id="{9D8AB236-242A-F198-19C1-F52C1FB8A379}"/>
+              </a:ext>
+            </a:extLst>
+          </p:cNvPr>
+          <p:cNvCxnSpPr>
+            <a:cxnSpLocks/>
+            <a:stCxn id="35" idx="2"/>
+            <a:endCxn id="3" idx="1"/>
+          </p:cNvCxnSpPr>
+          <p:nvPr/>
+        </p:nvCxnSpPr>
+        <p:spPr>
+          <a:xfrm rot="10800000" flipV="1">
+            <a:off x="4518888" y="2367155"/>
+            <a:ext cx="1802206" cy="2176954"/>
+          </a:xfrm>
+          <a:prstGeom prst="bentConnector3">
+            <a:avLst>
+              <a:gd name="adj1" fmla="val 112684"/>
+            </a:avLst>
+          </a:prstGeom>
+          <a:ln>
+            <a:tailEnd type="triangle"/>
+          </a:ln>
+        </p:spPr>
+        <p:style>
+          <a:lnRef idx="1">
+            <a:schemeClr val="accent1"/>
+          </a:lnRef>
+          <a:fillRef idx="0">
+            <a:schemeClr val="accent1"/>
+          </a:fillRef>
+          <a:effectRef idx="0">
+            <a:schemeClr val="accent1"/>
+          </a:effectRef>
+          <a:fontRef idx="minor">
+            <a:schemeClr val="tx1"/>
+          </a:fontRef>
+        </p:style>
+      </p:cxnSp>
+      <p:sp>
+        <p:nvSpPr>
+          <p:cNvPr id="30" name="TextBox 29">
+            <a:extLst>
+              <a:ext uri="{FF2B5EF4-FFF2-40B4-BE49-F238E27FC236}">
+                <a16:creationId xmlns:a16="http://schemas.microsoft.com/office/drawing/2014/main" id="{6799B65D-A31E-7E07-1E86-B92AFD0558BA}"/>
+              </a:ext>
+            </a:extLst>
+          </p:cNvPr>
+          <p:cNvSpPr txBox="1"/>
+          <p:nvPr/>
+        </p:nvSpPr>
+        <p:spPr>
+          <a:xfrm>
+            <a:off x="4257667" y="1919961"/>
+            <a:ext cx="2002451" cy="646331"/>
+          </a:xfrm>
+          <a:prstGeom prst="rect">
+            <a:avLst/>
+          </a:prstGeom>
+          <a:noFill/>
+        </p:spPr>
+        <p:txBody>
+          <a:bodyPr wrap="square" rtlCol="0">
+            <a:spAutoFit/>
+          </a:bodyPr>
+          <a:lstStyle/>
+          <a:p>
+            <a:r>
+              <a:rPr lang="en-US" sz="1200" dirty="0"/>
+              <a:t>repeat for every cluster node subgraph recursively up to the root node</a:t>
+            </a:r>
+          </a:p>
+        </p:txBody>
+      </p:sp>
+      <p:sp>
+        <p:nvSpPr>
+          <p:cNvPr id="35" name="Oval 34">
+            <a:extLst>
+              <a:ext uri="{FF2B5EF4-FFF2-40B4-BE49-F238E27FC236}">
+                <a16:creationId xmlns:a16="http://schemas.microsoft.com/office/drawing/2014/main" id="{19B960C9-F509-6F40-02AF-8DD1FE44B53F}"/>
+              </a:ext>
+            </a:extLst>
+          </p:cNvPr>
+          <p:cNvSpPr/>
+          <p:nvPr/>
+        </p:nvSpPr>
+        <p:spPr>
+          <a:xfrm>
+            <a:off x="6321094" y="2273756"/>
+            <a:ext cx="190649" cy="186797"/>
+          </a:xfrm>
+          <a:prstGeom prst="ellipse">
+            <a:avLst/>
+          </a:prstGeom>
+        </p:spPr>
+        <p:style>
+          <a:lnRef idx="2">
+            <a:schemeClr val="accent1">
+              <a:shade val="15000"/>
+            </a:schemeClr>
+          </a:lnRef>
+          <a:fillRef idx="1">
+            <a:schemeClr val="accent1"/>
+          </a:fillRef>
+          <a:effectRef idx="0">
+            <a:schemeClr val="accent1"/>
+          </a:effectRef>
+          <a:fontRef idx="minor">
+            <a:schemeClr val="lt1"/>
+          </a:fontRef>
+        </p:style>
+        <p:txBody>
+          <a:bodyPr rtlCol="0" anchor="ctr"/>
+          <a:lstStyle/>
+          <a:p>
+            <a:pPr algn="ctr"/>
+            <a:endParaRPr lang="en-US"/>
+          </a:p>
+        </p:txBody>
+      </p:sp>
+      <p:sp>
+        <p:nvSpPr>
+          <p:cNvPr id="40" name="TextBox 39">
+            <a:extLst>
+              <a:ext uri="{FF2B5EF4-FFF2-40B4-BE49-F238E27FC236}">
+                <a16:creationId xmlns:a16="http://schemas.microsoft.com/office/drawing/2014/main" id="{C87DF0E9-BD77-1FB6-DA74-B2186FC2CDEA}"/>
+              </a:ext>
+            </a:extLst>
+          </p:cNvPr>
+          <p:cNvSpPr txBox="1"/>
+          <p:nvPr/>
+        </p:nvSpPr>
+        <p:spPr>
+          <a:xfrm>
+            <a:off x="3666931" y="5956017"/>
+            <a:ext cx="8154955" cy="646331"/>
+          </a:xfrm>
+          <a:prstGeom prst="rect">
+            <a:avLst/>
+          </a:prstGeom>
+          <a:noFill/>
+        </p:spPr>
+        <p:txBody>
+          <a:bodyPr wrap="square" rtlCol="0">
+            <a:spAutoFit/>
+          </a:bodyPr>
+          <a:lstStyle/>
+          <a:p>
+            <a:r>
+              <a:rPr lang="en-US" dirty="0"/>
+              <a:t>This model encodes the complete system of clusters and leaf nodes all the way up to the root node.  This is the encoder portion of the system autoencoder</a:t>
+            </a:r>
+          </a:p>
+        </p:txBody>
+      </p:sp>
+      <p:sp>
+        <p:nvSpPr>
+          <p:cNvPr id="42" name="Freeform: Shape 41">
+            <a:extLst>
+              <a:ext uri="{FF2B5EF4-FFF2-40B4-BE49-F238E27FC236}">
+                <a16:creationId xmlns:a16="http://schemas.microsoft.com/office/drawing/2014/main" id="{389BD117-56B7-76B5-A821-EF3C6396E098}"/>
+              </a:ext>
+            </a:extLst>
+          </p:cNvPr>
+          <p:cNvSpPr/>
+          <p:nvPr/>
+        </p:nvSpPr>
+        <p:spPr>
+          <a:xfrm>
+            <a:off x="99510" y="2425959"/>
+            <a:ext cx="1710629" cy="2024743"/>
+          </a:xfrm>
+          <a:custGeom>
+            <a:avLst/>
+            <a:gdLst>
+              <a:gd name="connsiteX0" fmla="*/ 21788 w 1710629"/>
+              <a:gd name="connsiteY0" fmla="*/ 2024743 h 2024743"/>
+              <a:gd name="connsiteX1" fmla="*/ 236392 w 1710629"/>
+              <a:gd name="connsiteY1" fmla="*/ 643812 h 2024743"/>
+              <a:gd name="connsiteX2" fmla="*/ 1710629 w 1710629"/>
+              <a:gd name="connsiteY2" fmla="*/ 0 h 2024743"/>
+            </a:gdLst>
+            <a:ahLst/>
+            <a:cxnLst>
+              <a:cxn ang="0">
+                <a:pos x="connsiteX0" y="connsiteY0"/>
+              </a:cxn>
+              <a:cxn ang="0">
+                <a:pos x="connsiteX1" y="connsiteY1"/>
+              </a:cxn>
+              <a:cxn ang="0">
+                <a:pos x="connsiteX2" y="connsiteY2"/>
+              </a:cxn>
+            </a:cxnLst>
+            <a:rect l="l" t="t" r="r" b="b"/>
+            <a:pathLst>
+              <a:path w="1710629" h="2024743">
+                <a:moveTo>
+                  <a:pt x="21788" y="2024743"/>
+                </a:moveTo>
+                <a:cubicBezTo>
+                  <a:pt x="-11647" y="1503006"/>
+                  <a:pt x="-45081" y="981269"/>
+                  <a:pt x="236392" y="643812"/>
+                </a:cubicBezTo>
+                <a:cubicBezTo>
+                  <a:pt x="517865" y="306355"/>
+                  <a:pt x="1475809" y="111967"/>
+                  <a:pt x="1710629" y="0"/>
+                </a:cubicBezTo>
+              </a:path>
+            </a:pathLst>
+          </a:custGeom>
+          <a:noFill/>
+          <a:ln w="53975" cmpd="dbl">
+            <a:headEnd type="none"/>
+            <a:tailEnd type="triangle"/>
+          </a:ln>
+        </p:spPr>
+        <p:style>
+          <a:lnRef idx="2">
+            <a:schemeClr val="accent1">
+              <a:shade val="15000"/>
+            </a:schemeClr>
+          </a:lnRef>
+          <a:fillRef idx="1">
+            <a:schemeClr val="accent1"/>
+          </a:fillRef>
+          <a:effectRef idx="0">
+            <a:schemeClr val="accent1"/>
+          </a:effectRef>
+          <a:fontRef idx="minor">
+            <a:schemeClr val="lt1"/>
+          </a:fontRef>
+        </p:style>
+        <p:txBody>
+          <a:bodyPr rtlCol="0" anchor="ctr"/>
+          <a:lstStyle/>
+          <a:p>
+            <a:pPr algn="ctr"/>
+            <a:endParaRPr lang="en-US"/>
+          </a:p>
+        </p:txBody>
+      </p:sp>
+      <p:sp>
+        <p:nvSpPr>
+          <p:cNvPr id="43" name="TextBox 42">
+            <a:extLst>
+              <a:ext uri="{FF2B5EF4-FFF2-40B4-BE49-F238E27FC236}">
+                <a16:creationId xmlns:a16="http://schemas.microsoft.com/office/drawing/2014/main" id="{3E7D8270-F1C1-CC8A-76C4-23E74791ED61}"/>
+              </a:ext>
+            </a:extLst>
+          </p:cNvPr>
+          <p:cNvSpPr txBox="1"/>
+          <p:nvPr/>
+        </p:nvSpPr>
+        <p:spPr>
+          <a:xfrm>
+            <a:off x="98939" y="2345541"/>
+            <a:ext cx="1085938" cy="646331"/>
+          </a:xfrm>
+          <a:prstGeom prst="rect">
+            <a:avLst/>
+          </a:prstGeom>
+          <a:noFill/>
+        </p:spPr>
+        <p:txBody>
+          <a:bodyPr wrap="none" rtlCol="0">
+            <a:spAutoFit/>
+          </a:bodyPr>
+          <a:lstStyle/>
+          <a:p>
+            <a:r>
+              <a:rPr lang="en-US" dirty="0"/>
+              <a:t>recursive </a:t>
+            </a:r>
+          </a:p>
+          <a:p>
+            <a:r>
+              <a:rPr lang="en-US" dirty="0"/>
+              <a:t>up</a:t>
+            </a:r>
+          </a:p>
+        </p:txBody>
+      </p:sp>
+      <p:sp>
+        <p:nvSpPr>
+          <p:cNvPr id="4" name="TextBox 3">
+            <a:extLst>
+              <a:ext uri="{FF2B5EF4-FFF2-40B4-BE49-F238E27FC236}">
+                <a16:creationId xmlns:a16="http://schemas.microsoft.com/office/drawing/2014/main" id="{7C093689-B6E6-05BF-51B9-06CAD0BA41A4}"/>
+              </a:ext>
+            </a:extLst>
+          </p:cNvPr>
+          <p:cNvSpPr txBox="1"/>
+          <p:nvPr/>
+        </p:nvSpPr>
+        <p:spPr>
+          <a:xfrm>
+            <a:off x="8439150" y="365125"/>
+            <a:ext cx="2854499" cy="369332"/>
+          </a:xfrm>
+          <a:prstGeom prst="rect">
+            <a:avLst/>
+          </a:prstGeom>
+          <a:noFill/>
+        </p:spPr>
+        <p:txBody>
+          <a:bodyPr wrap="none" rtlCol="0">
+            <a:spAutoFit/>
+          </a:bodyPr>
+          <a:lstStyle/>
+          <a:p>
+            <a:r>
+              <a:rPr lang="en-US" dirty="0">
+                <a:solidFill>
+                  <a:srgbClr val="FF0000"/>
+                </a:solidFill>
+              </a:rPr>
+              <a:t>Encodes SUB-graph at time t</a:t>
+            </a:r>
+          </a:p>
+        </p:txBody>
+      </p:sp>
+    </p:spTree>
+    <p:extLst>
+      <p:ext uri="{BB962C8B-B14F-4D97-AF65-F5344CB8AC3E}">
+        <p14:creationId xmlns:p14="http://schemas.microsoft.com/office/powerpoint/2010/main" val="3791371677"/>
+      </p:ext>
+    </p:extLst>
+  </p:cSld>
+  <p:clrMapOvr>
+    <a:masterClrMapping/>
+  </p:clrMapOvr>
+</p:sld>
+</file>
+
+<file path=ppt/slides/slide2.xml><?xml version="1.0" encoding="utf-8"?>
+<p:sld xmlns:a="http://schemas.openxmlformats.org/drawingml/2006/main" xmlns:r="http://schemas.openxmlformats.org/officeDocument/2006/relationships" xmlns:p="http://schemas.openxmlformats.org/presentationml/2006/main">
+  <p:cSld>
+    <p:spTree>
+      <p:nvGrpSpPr>
+        <p:cNvPr id="1" name=""/>
+        <p:cNvGrpSpPr/>
+        <p:nvPr/>
+      </p:nvGrpSpPr>
+      <p:grpSpPr>
+        <a:xfrm>
+          <a:off x="0" y="0"/>
+          <a:ext cx="0" cy="0"/>
+          <a:chOff x="0" y="0"/>
+          <a:chExt cx="0" cy="0"/>
+        </a:xfrm>
+      </p:grpSpPr>
+      <p:sp>
+        <p:nvSpPr>
+          <p:cNvPr id="2" name="Title 1">
+            <a:extLst>
+              <a:ext uri="{FF2B5EF4-FFF2-40B4-BE49-F238E27FC236}">
+                <a16:creationId xmlns:a16="http://schemas.microsoft.com/office/drawing/2014/main" id="{0272A585-394F-0659-D6C5-6EE8A2D8AE9A}"/>
+              </a:ext>
+            </a:extLst>
+          </p:cNvPr>
+          <p:cNvSpPr>
+            <a:spLocks noGrp="1"/>
+          </p:cNvSpPr>
+          <p:nvPr>
+            <p:ph type="title"/>
+          </p:nvPr>
+        </p:nvSpPr>
+        <p:spPr>
+          <a:xfrm>
+            <a:off x="838200" y="365125"/>
+            <a:ext cx="7419392" cy="1325563"/>
+          </a:xfrm>
+        </p:spPr>
+        <p:txBody>
+          <a:bodyPr/>
+          <a:lstStyle/>
+          <a:p>
+            <a:r>
+              <a:rPr lang="en-US" dirty="0"/>
+              <a:t>Hierarchical Model - Decoder</a:t>
+            </a:r>
+          </a:p>
+        </p:txBody>
+      </p:sp>
+      <p:sp>
+        <p:nvSpPr>
+          <p:cNvPr id="93" name="Oval 92">
+            <a:extLst>
+              <a:ext uri="{FF2B5EF4-FFF2-40B4-BE49-F238E27FC236}">
+                <a16:creationId xmlns:a16="http://schemas.microsoft.com/office/drawing/2014/main" id="{63AF4775-79F1-C91A-DA0D-3513E260635F}"/>
+              </a:ext>
+            </a:extLst>
+          </p:cNvPr>
+          <p:cNvSpPr/>
+          <p:nvPr/>
+        </p:nvSpPr>
+        <p:spPr>
+          <a:xfrm>
+            <a:off x="714375" y="4637398"/>
+            <a:ext cx="323850" cy="316248"/>
+          </a:xfrm>
+          <a:prstGeom prst="ellipse">
+            <a:avLst/>
+          </a:prstGeom>
+        </p:spPr>
+        <p:style>
+          <a:lnRef idx="2">
+            <a:schemeClr val="accent1">
+              <a:shade val="15000"/>
+            </a:schemeClr>
+          </a:lnRef>
+          <a:fillRef idx="1">
+            <a:schemeClr val="accent1"/>
+          </a:fillRef>
+          <a:effectRef idx="0">
+            <a:schemeClr val="accent1"/>
+          </a:effectRef>
+          <a:fontRef idx="minor">
+            <a:schemeClr val="lt1"/>
+          </a:fontRef>
+        </p:style>
+        <p:txBody>
+          <a:bodyPr rtlCol="0" anchor="ctr"/>
+          <a:lstStyle/>
+          <a:p>
+            <a:pPr algn="ctr"/>
+            <a:r>
+              <a:rPr lang="en-US" dirty="0"/>
+              <a:t>n</a:t>
+            </a:r>
+          </a:p>
+        </p:txBody>
+      </p:sp>
+      <p:sp>
+        <p:nvSpPr>
+          <p:cNvPr id="94" name="Oval 93">
+            <a:extLst>
+              <a:ext uri="{FF2B5EF4-FFF2-40B4-BE49-F238E27FC236}">
+                <a16:creationId xmlns:a16="http://schemas.microsoft.com/office/drawing/2014/main" id="{4BC3DEFE-D792-D47E-6E16-4049186C7411}"/>
+              </a:ext>
+            </a:extLst>
+          </p:cNvPr>
+          <p:cNvSpPr/>
+          <p:nvPr/>
+        </p:nvSpPr>
+        <p:spPr>
+          <a:xfrm>
+            <a:off x="2754887" y="3706323"/>
+            <a:ext cx="323850" cy="316248"/>
+          </a:xfrm>
+          <a:prstGeom prst="ellipse">
+            <a:avLst/>
+          </a:prstGeom>
+        </p:spPr>
+        <p:style>
+          <a:lnRef idx="2">
+            <a:schemeClr val="accent1">
+              <a:shade val="15000"/>
+            </a:schemeClr>
+          </a:lnRef>
+          <a:fillRef idx="1">
+            <a:schemeClr val="accent1"/>
+          </a:fillRef>
+          <a:effectRef idx="0">
+            <a:schemeClr val="accent1"/>
+          </a:effectRef>
+          <a:fontRef idx="minor">
+            <a:schemeClr val="lt1"/>
+          </a:fontRef>
+        </p:style>
+        <p:txBody>
+          <a:bodyPr rtlCol="0" anchor="ctr"/>
+          <a:lstStyle/>
+          <a:p>
+            <a:pPr algn="ctr"/>
+            <a:r>
+              <a:rPr lang="en-US" dirty="0"/>
+              <a:t>n</a:t>
+            </a:r>
+          </a:p>
+        </p:txBody>
+      </p:sp>
+      <p:sp>
+        <p:nvSpPr>
+          <p:cNvPr id="95" name="Oval 94">
+            <a:extLst>
+              <a:ext uri="{FF2B5EF4-FFF2-40B4-BE49-F238E27FC236}">
+                <a16:creationId xmlns:a16="http://schemas.microsoft.com/office/drawing/2014/main" id="{9936B5F0-748A-01A9-9877-741DCE07BE4C}"/>
+              </a:ext>
+            </a:extLst>
+          </p:cNvPr>
+          <p:cNvSpPr/>
+          <p:nvPr/>
+        </p:nvSpPr>
+        <p:spPr>
+          <a:xfrm>
+            <a:off x="1378368" y="5303148"/>
+            <a:ext cx="323850" cy="316248"/>
+          </a:xfrm>
+          <a:prstGeom prst="ellipse">
+            <a:avLst/>
+          </a:prstGeom>
+        </p:spPr>
+        <p:style>
+          <a:lnRef idx="2">
+            <a:schemeClr val="accent1">
+              <a:shade val="15000"/>
+            </a:schemeClr>
+          </a:lnRef>
+          <a:fillRef idx="1">
+            <a:schemeClr val="accent1"/>
+          </a:fillRef>
+          <a:effectRef idx="0">
+            <a:schemeClr val="accent1"/>
+          </a:effectRef>
+          <a:fontRef idx="minor">
+            <a:schemeClr val="lt1"/>
+          </a:fontRef>
+        </p:style>
+        <p:txBody>
+          <a:bodyPr rtlCol="0" anchor="ctr"/>
+          <a:lstStyle/>
+          <a:p>
+            <a:pPr algn="ctr"/>
+            <a:r>
+              <a:rPr lang="en-US" dirty="0"/>
+              <a:t>n</a:t>
+            </a:r>
+          </a:p>
+        </p:txBody>
+      </p:sp>
+      <p:sp>
+        <p:nvSpPr>
+          <p:cNvPr id="96" name="Oval 95">
+            <a:extLst>
+              <a:ext uri="{FF2B5EF4-FFF2-40B4-BE49-F238E27FC236}">
+                <a16:creationId xmlns:a16="http://schemas.microsoft.com/office/drawing/2014/main" id="{9E134E71-ED41-45F2-BA18-6B782C407D00}"/>
+              </a:ext>
+            </a:extLst>
+          </p:cNvPr>
+          <p:cNvSpPr/>
+          <p:nvPr/>
+        </p:nvSpPr>
+        <p:spPr>
+          <a:xfrm>
+            <a:off x="2004261" y="4631674"/>
+            <a:ext cx="323850" cy="316248"/>
+          </a:xfrm>
+          <a:prstGeom prst="ellipse">
+            <a:avLst/>
+          </a:prstGeom>
+        </p:spPr>
+        <p:style>
+          <a:lnRef idx="2">
+            <a:schemeClr val="accent1">
+              <a:shade val="15000"/>
+            </a:schemeClr>
+          </a:lnRef>
+          <a:fillRef idx="1">
+            <a:schemeClr val="accent1"/>
+          </a:fillRef>
+          <a:effectRef idx="0">
+            <a:schemeClr val="accent1"/>
+          </a:effectRef>
+          <a:fontRef idx="minor">
+            <a:schemeClr val="lt1"/>
+          </a:fontRef>
+        </p:style>
+        <p:txBody>
+          <a:bodyPr rtlCol="0" anchor="ctr"/>
+          <a:lstStyle/>
+          <a:p>
+            <a:pPr algn="ctr"/>
+            <a:r>
+              <a:rPr lang="en-US" dirty="0"/>
+              <a:t>n</a:t>
+            </a:r>
+          </a:p>
+        </p:txBody>
+      </p:sp>
+      <p:sp>
+        <p:nvSpPr>
+          <p:cNvPr id="97" name="Oval 96">
+            <a:extLst>
+              <a:ext uri="{FF2B5EF4-FFF2-40B4-BE49-F238E27FC236}">
+                <a16:creationId xmlns:a16="http://schemas.microsoft.com/office/drawing/2014/main" id="{958C5D8A-601D-061A-1C51-2635EC5894F0}"/>
+              </a:ext>
+            </a:extLst>
+          </p:cNvPr>
+          <p:cNvSpPr/>
+          <p:nvPr/>
+        </p:nvSpPr>
+        <p:spPr>
+          <a:xfrm>
+            <a:off x="1378368" y="3555354"/>
+            <a:ext cx="323850" cy="316248"/>
+          </a:xfrm>
+          <a:prstGeom prst="ellipse">
+            <a:avLst/>
+          </a:prstGeom>
+        </p:spPr>
+        <p:style>
+          <a:lnRef idx="2">
+            <a:schemeClr val="accent1">
+              <a:shade val="15000"/>
+            </a:schemeClr>
+          </a:lnRef>
+          <a:fillRef idx="1">
+            <a:schemeClr val="accent1"/>
+          </a:fillRef>
+          <a:effectRef idx="0">
+            <a:schemeClr val="accent1"/>
+          </a:effectRef>
+          <a:fontRef idx="minor">
+            <a:schemeClr val="lt1"/>
+          </a:fontRef>
+        </p:style>
+        <p:txBody>
+          <a:bodyPr rtlCol="0" anchor="ctr"/>
+          <a:lstStyle/>
+          <a:p>
+            <a:pPr algn="ctr"/>
+            <a:r>
+              <a:rPr lang="en-US" dirty="0"/>
+              <a:t>n</a:t>
+            </a:r>
+          </a:p>
+        </p:txBody>
+      </p:sp>
+      <p:cxnSp>
+        <p:nvCxnSpPr>
+          <p:cNvPr id="99" name="Straight Arrow Connector 98">
+            <a:extLst>
+              <a:ext uri="{FF2B5EF4-FFF2-40B4-BE49-F238E27FC236}">
+                <a16:creationId xmlns:a16="http://schemas.microsoft.com/office/drawing/2014/main" id="{471C9179-9E55-F611-AD28-6CD425A2ABD4}"/>
+              </a:ext>
+            </a:extLst>
+          </p:cNvPr>
+          <p:cNvCxnSpPr>
+            <a:stCxn id="96" idx="1"/>
+            <a:endCxn id="97" idx="5"/>
+          </p:cNvCxnSpPr>
+          <p:nvPr/>
+        </p:nvCxnSpPr>
+        <p:spPr>
+          <a:xfrm flipH="1" flipV="1">
+            <a:off x="1654791" y="3825289"/>
+            <a:ext cx="396897" cy="852698"/>
           </a:xfrm>
           <a:prstGeom prst="straightConnector1">
             <a:avLst/>
@@ -5002,24 +5463,23 @@
       </p:cxnSp>
       <p:cxnSp>
         <p:nvCxnSpPr>
-          <p:cNvPr id="86" name="Straight Arrow Connector 85">
-            <a:extLst>
-              <a:ext uri="{FF2B5EF4-FFF2-40B4-BE49-F238E27FC236}">
-                <a16:creationId xmlns:a16="http://schemas.microsoft.com/office/drawing/2014/main" id="{CDC7C367-474D-8FD8-DD7B-6C3F5AA89A03}"/>
+          <p:cNvPr id="101" name="Straight Arrow Connector 100">
+            <a:extLst>
+              <a:ext uri="{FF2B5EF4-FFF2-40B4-BE49-F238E27FC236}">
+                <a16:creationId xmlns:a16="http://schemas.microsoft.com/office/drawing/2014/main" id="{1614CFD4-7F99-779B-8CE1-C64BD0A90647}"/>
               </a:ext>
             </a:extLst>
           </p:cNvPr>
           <p:cNvCxnSpPr>
-            <a:cxnSpLocks/>
-            <a:stCxn id="71" idx="3"/>
-            <a:endCxn id="82" idx="1"/>
+            <a:stCxn id="93" idx="7"/>
+            <a:endCxn id="97" idx="3"/>
           </p:cNvCxnSpPr>
           <p:nvPr/>
         </p:nvCxnSpPr>
         <p:spPr>
-          <a:xfrm>
-            <a:off x="5489036" y="4247951"/>
-            <a:ext cx="722543" cy="15170"/>
+          <a:xfrm flipV="1">
+            <a:off x="990798" y="3825289"/>
+            <a:ext cx="434997" cy="858422"/>
           </a:xfrm>
           <a:prstGeom prst="straightConnector1">
             <a:avLst/>
@@ -5045,24 +5505,23 @@
       </p:cxnSp>
       <p:cxnSp>
         <p:nvCxnSpPr>
-          <p:cNvPr id="87" name="Straight Arrow Connector 86">
-            <a:extLst>
-              <a:ext uri="{FF2B5EF4-FFF2-40B4-BE49-F238E27FC236}">
-                <a16:creationId xmlns:a16="http://schemas.microsoft.com/office/drawing/2014/main" id="{BD7D556C-20DE-7ECD-DF58-FAD62CB0BD50}"/>
+          <p:cNvPr id="103" name="Straight Arrow Connector 102">
+            <a:extLst>
+              <a:ext uri="{FF2B5EF4-FFF2-40B4-BE49-F238E27FC236}">
+                <a16:creationId xmlns:a16="http://schemas.microsoft.com/office/drawing/2014/main" id="{BC131A02-832A-5FCE-ADDA-835E0A19B751}"/>
               </a:ext>
             </a:extLst>
           </p:cNvPr>
           <p:cNvCxnSpPr>
-            <a:cxnSpLocks/>
-            <a:stCxn id="82" idx="3"/>
-            <a:endCxn id="72" idx="1"/>
+            <a:stCxn id="93" idx="5"/>
+            <a:endCxn id="95" idx="1"/>
           </p:cNvCxnSpPr>
           <p:nvPr/>
         </p:nvCxnSpPr>
         <p:spPr>
           <a:xfrm>
-            <a:off x="8021690" y="4263121"/>
-            <a:ext cx="722544" cy="1"/>
+            <a:off x="990798" y="4907333"/>
+            <a:ext cx="434997" cy="442128"/>
           </a:xfrm>
           <a:prstGeom prst="straightConnector1">
             <a:avLst/>
@@ -5086,12 +5545,187 @@
           </a:fontRef>
         </p:style>
       </p:cxnSp>
-      <p:sp>
-        <p:nvSpPr>
-          <p:cNvPr id="94" name="TextBox 93">
-            <a:extLst>
-              <a:ext uri="{FF2B5EF4-FFF2-40B4-BE49-F238E27FC236}">
-                <a16:creationId xmlns:a16="http://schemas.microsoft.com/office/drawing/2014/main" id="{3EF1FBCA-F824-A415-AD41-31EE2BC6B522}"/>
+      <p:cxnSp>
+        <p:nvCxnSpPr>
+          <p:cNvPr id="105" name="Straight Arrow Connector 104">
+            <a:extLst>
+              <a:ext uri="{FF2B5EF4-FFF2-40B4-BE49-F238E27FC236}">
+                <a16:creationId xmlns:a16="http://schemas.microsoft.com/office/drawing/2014/main" id="{2E05382D-8682-25F2-3CDB-A1533FBC5B7F}"/>
+              </a:ext>
+            </a:extLst>
+          </p:cNvPr>
+          <p:cNvCxnSpPr>
+            <a:stCxn id="95" idx="7"/>
+            <a:endCxn id="96" idx="3"/>
+          </p:cNvCxnSpPr>
+          <p:nvPr/>
+        </p:nvCxnSpPr>
+        <p:spPr>
+          <a:xfrm flipV="1">
+            <a:off x="1654791" y="4901609"/>
+            <a:ext cx="396897" cy="447852"/>
+          </a:xfrm>
+          <a:prstGeom prst="straightConnector1">
+            <a:avLst/>
+          </a:prstGeom>
+          <a:ln>
+            <a:tailEnd type="triangle"/>
+          </a:ln>
+        </p:spPr>
+        <p:style>
+          <a:lnRef idx="1">
+            <a:schemeClr val="accent1"/>
+          </a:lnRef>
+          <a:fillRef idx="0">
+            <a:schemeClr val="accent1"/>
+          </a:fillRef>
+          <a:effectRef idx="0">
+            <a:schemeClr val="accent1"/>
+          </a:effectRef>
+          <a:fontRef idx="minor">
+            <a:schemeClr val="tx1"/>
+          </a:fontRef>
+        </p:style>
+      </p:cxnSp>
+      <p:sp>
+        <p:nvSpPr>
+          <p:cNvPr id="106" name="Oval 105">
+            <a:extLst>
+              <a:ext uri="{FF2B5EF4-FFF2-40B4-BE49-F238E27FC236}">
+                <a16:creationId xmlns:a16="http://schemas.microsoft.com/office/drawing/2014/main" id="{C994457A-2762-1600-7D3F-C125CD315729}"/>
+              </a:ext>
+            </a:extLst>
+          </p:cNvPr>
+          <p:cNvSpPr/>
+          <p:nvPr/>
+        </p:nvSpPr>
+        <p:spPr>
+          <a:xfrm>
+            <a:off x="2003630" y="2218994"/>
+            <a:ext cx="323850" cy="316248"/>
+          </a:xfrm>
+          <a:prstGeom prst="ellipse">
+            <a:avLst/>
+          </a:prstGeom>
+        </p:spPr>
+        <p:style>
+          <a:lnRef idx="2">
+            <a:schemeClr val="accent1">
+              <a:shade val="15000"/>
+            </a:schemeClr>
+          </a:lnRef>
+          <a:fillRef idx="1">
+            <a:schemeClr val="accent1"/>
+          </a:fillRef>
+          <a:effectRef idx="0">
+            <a:schemeClr val="accent1"/>
+          </a:effectRef>
+          <a:fontRef idx="minor">
+            <a:schemeClr val="lt1"/>
+          </a:fontRef>
+        </p:style>
+        <p:txBody>
+          <a:bodyPr rtlCol="0" anchor="ctr"/>
+          <a:lstStyle/>
+          <a:p>
+            <a:pPr algn="ctr"/>
+            <a:r>
+              <a:rPr lang="en-US" dirty="0"/>
+              <a:t>r</a:t>
+            </a:r>
+          </a:p>
+        </p:txBody>
+      </p:sp>
+      <p:cxnSp>
+        <p:nvCxnSpPr>
+          <p:cNvPr id="108" name="Straight Arrow Connector 107">
+            <a:extLst>
+              <a:ext uri="{FF2B5EF4-FFF2-40B4-BE49-F238E27FC236}">
+                <a16:creationId xmlns:a16="http://schemas.microsoft.com/office/drawing/2014/main" id="{3A123BD7-5AF9-2A45-6191-45CEC27F6930}"/>
+              </a:ext>
+            </a:extLst>
+          </p:cNvPr>
+          <p:cNvCxnSpPr>
+            <a:stCxn id="97" idx="7"/>
+            <a:endCxn id="106" idx="3"/>
+          </p:cNvCxnSpPr>
+          <p:nvPr/>
+        </p:nvCxnSpPr>
+        <p:spPr>
+          <a:xfrm flipV="1">
+            <a:off x="1654791" y="2488929"/>
+            <a:ext cx="396266" cy="1112738"/>
+          </a:xfrm>
+          <a:prstGeom prst="straightConnector1">
+            <a:avLst/>
+          </a:prstGeom>
+          <a:ln>
+            <a:tailEnd type="triangle"/>
+          </a:ln>
+        </p:spPr>
+        <p:style>
+          <a:lnRef idx="1">
+            <a:schemeClr val="accent1"/>
+          </a:lnRef>
+          <a:fillRef idx="0">
+            <a:schemeClr val="accent1"/>
+          </a:fillRef>
+          <a:effectRef idx="0">
+            <a:schemeClr val="accent1"/>
+          </a:effectRef>
+          <a:fontRef idx="minor">
+            <a:schemeClr val="tx1"/>
+          </a:fontRef>
+        </p:style>
+      </p:cxnSp>
+      <p:cxnSp>
+        <p:nvCxnSpPr>
+          <p:cNvPr id="110" name="Straight Arrow Connector 109">
+            <a:extLst>
+              <a:ext uri="{FF2B5EF4-FFF2-40B4-BE49-F238E27FC236}">
+                <a16:creationId xmlns:a16="http://schemas.microsoft.com/office/drawing/2014/main" id="{2C299DE4-3CB9-3705-069A-5D0074CF340C}"/>
+              </a:ext>
+            </a:extLst>
+          </p:cNvPr>
+          <p:cNvCxnSpPr>
+            <a:stCxn id="94" idx="1"/>
+            <a:endCxn id="106" idx="5"/>
+          </p:cNvCxnSpPr>
+          <p:nvPr/>
+        </p:nvCxnSpPr>
+        <p:spPr>
+          <a:xfrm flipH="1" flipV="1">
+            <a:off x="2280053" y="2488929"/>
+            <a:ext cx="522261" cy="1263707"/>
+          </a:xfrm>
+          <a:prstGeom prst="straightConnector1">
+            <a:avLst/>
+          </a:prstGeom>
+          <a:ln>
+            <a:tailEnd type="triangle"/>
+          </a:ln>
+        </p:spPr>
+        <p:style>
+          <a:lnRef idx="1">
+            <a:schemeClr val="accent1"/>
+          </a:lnRef>
+          <a:fillRef idx="0">
+            <a:schemeClr val="accent1"/>
+          </a:fillRef>
+          <a:effectRef idx="0">
+            <a:schemeClr val="accent1"/>
+          </a:effectRef>
+          <a:fontRef idx="minor">
+            <a:schemeClr val="tx1"/>
+          </a:fontRef>
+        </p:style>
+      </p:cxnSp>
+      <p:sp>
+        <p:nvSpPr>
+          <p:cNvPr id="112" name="TextBox 111">
+            <a:extLst>
+              <a:ext uri="{FF2B5EF4-FFF2-40B4-BE49-F238E27FC236}">
+                <a16:creationId xmlns:a16="http://schemas.microsoft.com/office/drawing/2014/main" id="{D3269FF5-82EB-091E-7B3F-0274B335B1F9}"/>
               </a:ext>
             </a:extLst>
           </p:cNvPr>
@@ -5100,8 +5734,8 @@
         </p:nvSpPr>
         <p:spPr>
           <a:xfrm>
-            <a:off x="4184074" y="226892"/>
-            <a:ext cx="7669763" cy="1077218"/>
+            <a:off x="375927" y="3118941"/>
+            <a:ext cx="1151329" cy="1200329"/>
           </a:xfrm>
           <a:prstGeom prst="rect">
             <a:avLst/>
@@ -5115,8 +5749,832 @@
           <a:lstStyle/>
           <a:p>
             <a:r>
-              <a:rPr lang="en-US" sz="3200" dirty="0"/>
-              <a:t>Message Passing Model for Directed Graph with Distinct Ports</a:t>
+              <a:rPr lang="en-US" dirty="0"/>
+              <a:t>clustering</a:t>
+            </a:r>
+          </a:p>
+          <a:p>
+            <a:r>
+              <a:rPr lang="en-US" dirty="0"/>
+              <a:t>node (base anchor)</a:t>
+            </a:r>
+          </a:p>
+        </p:txBody>
+      </p:sp>
+      <p:sp>
+        <p:nvSpPr>
+          <p:cNvPr id="113" name="TextBox 112">
+            <a:extLst>
+              <a:ext uri="{FF2B5EF4-FFF2-40B4-BE49-F238E27FC236}">
+                <a16:creationId xmlns:a16="http://schemas.microsoft.com/office/drawing/2014/main" id="{21153777-332B-7C0B-2A30-052F25683F9D}"/>
+              </a:ext>
+            </a:extLst>
+          </p:cNvPr>
+          <p:cNvSpPr txBox="1"/>
+          <p:nvPr/>
+        </p:nvSpPr>
+        <p:spPr>
+          <a:xfrm>
+            <a:off x="2341147" y="1629558"/>
+            <a:ext cx="1151329" cy="923330"/>
+          </a:xfrm>
+          <a:prstGeom prst="rect">
+            <a:avLst/>
+          </a:prstGeom>
+          <a:noFill/>
+        </p:spPr>
+        <p:txBody>
+          <a:bodyPr wrap="square" rtlCol="0">
+            <a:spAutoFit/>
+          </a:bodyPr>
+          <a:lstStyle/>
+          <a:p>
+            <a:r>
+              <a:rPr lang="en-US" dirty="0"/>
+              <a:t>root clustering</a:t>
+            </a:r>
+          </a:p>
+          <a:p>
+            <a:r>
+              <a:rPr lang="en-US" dirty="0"/>
+              <a:t>node</a:t>
+            </a:r>
+          </a:p>
+        </p:txBody>
+      </p:sp>
+      <p:sp>
+        <p:nvSpPr>
+          <p:cNvPr id="114" name="TextBox 113">
+            <a:extLst>
+              <a:ext uri="{FF2B5EF4-FFF2-40B4-BE49-F238E27FC236}">
+                <a16:creationId xmlns:a16="http://schemas.microsoft.com/office/drawing/2014/main" id="{77D79AAD-9683-9A44-8442-7DCF825B98DC}"/>
+              </a:ext>
+            </a:extLst>
+          </p:cNvPr>
+          <p:cNvSpPr txBox="1"/>
+          <p:nvPr/>
+        </p:nvSpPr>
+        <p:spPr>
+          <a:xfrm>
+            <a:off x="3144054" y="3573533"/>
+            <a:ext cx="1151329" cy="646331"/>
+          </a:xfrm>
+          <a:prstGeom prst="rect">
+            <a:avLst/>
+          </a:prstGeom>
+          <a:noFill/>
+        </p:spPr>
+        <p:txBody>
+          <a:bodyPr wrap="square" rtlCol="0">
+            <a:spAutoFit/>
+          </a:bodyPr>
+          <a:lstStyle/>
+          <a:p>
+            <a:r>
+              <a:rPr lang="en-US" dirty="0"/>
+              <a:t>leaf</a:t>
+            </a:r>
+          </a:p>
+          <a:p>
+            <a:r>
+              <a:rPr lang="en-US" dirty="0"/>
+              <a:t>node</a:t>
+            </a:r>
+          </a:p>
+        </p:txBody>
+      </p:sp>
+      <p:sp>
+        <p:nvSpPr>
+          <p:cNvPr id="115" name="TextBox 114">
+            <a:extLst>
+              <a:ext uri="{FF2B5EF4-FFF2-40B4-BE49-F238E27FC236}">
+                <a16:creationId xmlns:a16="http://schemas.microsoft.com/office/drawing/2014/main" id="{3021FE79-C970-35F7-013F-159EA66DF1EB}"/>
+              </a:ext>
+            </a:extLst>
+          </p:cNvPr>
+          <p:cNvSpPr txBox="1"/>
+          <p:nvPr/>
+        </p:nvSpPr>
+        <p:spPr>
+          <a:xfrm>
+            <a:off x="2305749" y="4459543"/>
+            <a:ext cx="711976" cy="646331"/>
+          </a:xfrm>
+          <a:prstGeom prst="rect">
+            <a:avLst/>
+          </a:prstGeom>
+          <a:noFill/>
+        </p:spPr>
+        <p:txBody>
+          <a:bodyPr wrap="square" rtlCol="0">
+            <a:spAutoFit/>
+          </a:bodyPr>
+          <a:lstStyle/>
+          <a:p>
+            <a:r>
+              <a:rPr lang="en-US" dirty="0"/>
+              <a:t>leaf</a:t>
+            </a:r>
+          </a:p>
+          <a:p>
+            <a:r>
+              <a:rPr lang="en-US" dirty="0"/>
+              <a:t>node</a:t>
+            </a:r>
+          </a:p>
+        </p:txBody>
+      </p:sp>
+      <p:sp>
+        <p:nvSpPr>
+          <p:cNvPr id="116" name="TextBox 115">
+            <a:extLst>
+              <a:ext uri="{FF2B5EF4-FFF2-40B4-BE49-F238E27FC236}">
+                <a16:creationId xmlns:a16="http://schemas.microsoft.com/office/drawing/2014/main" id="{2BA346CF-9B92-6529-0E97-F2702F9D8ED0}"/>
+              </a:ext>
+            </a:extLst>
+          </p:cNvPr>
+          <p:cNvSpPr txBox="1"/>
+          <p:nvPr/>
+        </p:nvSpPr>
+        <p:spPr>
+          <a:xfrm>
+            <a:off x="1231079" y="5644868"/>
+            <a:ext cx="772551" cy="646331"/>
+          </a:xfrm>
+          <a:prstGeom prst="rect">
+            <a:avLst/>
+          </a:prstGeom>
+          <a:noFill/>
+        </p:spPr>
+        <p:txBody>
+          <a:bodyPr wrap="square" rtlCol="0">
+            <a:spAutoFit/>
+          </a:bodyPr>
+          <a:lstStyle/>
+          <a:p>
+            <a:r>
+              <a:rPr lang="en-US" dirty="0"/>
+              <a:t>leaf</a:t>
+            </a:r>
+          </a:p>
+          <a:p>
+            <a:r>
+              <a:rPr lang="en-US" dirty="0"/>
+              <a:t>node</a:t>
+            </a:r>
+          </a:p>
+        </p:txBody>
+      </p:sp>
+      <p:sp>
+        <p:nvSpPr>
+          <p:cNvPr id="117" name="TextBox 116">
+            <a:extLst>
+              <a:ext uri="{FF2B5EF4-FFF2-40B4-BE49-F238E27FC236}">
+                <a16:creationId xmlns:a16="http://schemas.microsoft.com/office/drawing/2014/main" id="{B9A96ED3-5668-2F55-0934-BAE7D5645298}"/>
+              </a:ext>
+            </a:extLst>
+          </p:cNvPr>
+          <p:cNvSpPr txBox="1"/>
+          <p:nvPr/>
+        </p:nvSpPr>
+        <p:spPr>
+          <a:xfrm>
+            <a:off x="71316" y="4544109"/>
+            <a:ext cx="711976" cy="646331"/>
+          </a:xfrm>
+          <a:prstGeom prst="rect">
+            <a:avLst/>
+          </a:prstGeom>
+          <a:noFill/>
+        </p:spPr>
+        <p:txBody>
+          <a:bodyPr wrap="square" rtlCol="0">
+            <a:spAutoFit/>
+          </a:bodyPr>
+          <a:lstStyle/>
+          <a:p>
+            <a:r>
+              <a:rPr lang="en-US" dirty="0"/>
+              <a:t>leaf</a:t>
+            </a:r>
+          </a:p>
+          <a:p>
+            <a:r>
+              <a:rPr lang="en-US" dirty="0"/>
+              <a:t>node</a:t>
+            </a:r>
+          </a:p>
+        </p:txBody>
+      </p:sp>
+      <p:sp>
+        <p:nvSpPr>
+          <p:cNvPr id="118" name="Rectangle: Rounded Corners 117">
+            <a:extLst>
+              <a:ext uri="{FF2B5EF4-FFF2-40B4-BE49-F238E27FC236}">
+                <a16:creationId xmlns:a16="http://schemas.microsoft.com/office/drawing/2014/main" id="{9E5CB496-4599-5F5E-783A-14FFCAB8F10A}"/>
+              </a:ext>
+            </a:extLst>
+          </p:cNvPr>
+          <p:cNvSpPr/>
+          <p:nvPr/>
+        </p:nvSpPr>
+        <p:spPr>
+          <a:xfrm>
+            <a:off x="0" y="4478159"/>
+            <a:ext cx="3017725" cy="1813040"/>
+          </a:xfrm>
+          <a:prstGeom prst="roundRect">
+            <a:avLst/>
+          </a:prstGeom>
+          <a:noFill/>
+          <a:ln w="9525" cap="flat" cmpd="sng" algn="ctr">
+            <a:solidFill>
+              <a:schemeClr val="accent2"/>
+            </a:solidFill>
+            <a:prstDash val="solid"/>
+            <a:round/>
+            <a:headEnd type="none" w="med" len="med"/>
+            <a:tailEnd type="none" w="med" len="med"/>
+          </a:ln>
+        </p:spPr>
+        <p:style>
+          <a:lnRef idx="0">
+            <a:scrgbClr r="0" g="0" b="0"/>
+          </a:lnRef>
+          <a:fillRef idx="0">
+            <a:scrgbClr r="0" g="0" b="0"/>
+          </a:fillRef>
+          <a:effectRef idx="0">
+            <a:scrgbClr r="0" g="0" b="0"/>
+          </a:effectRef>
+          <a:fontRef idx="minor">
+            <a:schemeClr val="accent2"/>
+          </a:fontRef>
+        </p:style>
+        <p:txBody>
+          <a:bodyPr rtlCol="0" anchor="ctr"/>
+          <a:lstStyle/>
+          <a:p>
+            <a:pPr algn="ctr"/>
+            <a:endParaRPr lang="en-US"/>
+          </a:p>
+        </p:txBody>
+      </p:sp>
+      <p:sp>
+        <p:nvSpPr>
+          <p:cNvPr id="119" name="TextBox 118">
+            <a:extLst>
+              <a:ext uri="{FF2B5EF4-FFF2-40B4-BE49-F238E27FC236}">
+                <a16:creationId xmlns:a16="http://schemas.microsoft.com/office/drawing/2014/main" id="{63B42BFE-3529-4C5F-0CE2-328804DCD6BB}"/>
+              </a:ext>
+            </a:extLst>
+          </p:cNvPr>
+          <p:cNvSpPr txBox="1"/>
+          <p:nvPr/>
+        </p:nvSpPr>
+        <p:spPr>
+          <a:xfrm>
+            <a:off x="2045794" y="5956018"/>
+            <a:ext cx="622093" cy="369332"/>
+          </a:xfrm>
+          <a:prstGeom prst="rect">
+            <a:avLst/>
+          </a:prstGeom>
+          <a:noFill/>
+        </p:spPr>
+        <p:txBody>
+          <a:bodyPr wrap="none" rtlCol="0">
+            <a:spAutoFit/>
+          </a:bodyPr>
+          <a:lstStyle/>
+          <a:p>
+            <a:r>
+              <a:rPr lang="en-US" dirty="0">
+                <a:solidFill>
+                  <a:schemeClr val="accent2"/>
+                </a:solidFill>
+              </a:rPr>
+              <a:t>level</a:t>
+            </a:r>
+          </a:p>
+        </p:txBody>
+      </p:sp>
+      <p:sp>
+        <p:nvSpPr>
+          <p:cNvPr id="120" name="Rectangle: Rounded Corners 119">
+            <a:extLst>
+              <a:ext uri="{FF2B5EF4-FFF2-40B4-BE49-F238E27FC236}">
+                <a16:creationId xmlns:a16="http://schemas.microsoft.com/office/drawing/2014/main" id="{AC95B2E0-5D52-9EEA-13CD-4CF394AD40B3}"/>
+              </a:ext>
+            </a:extLst>
+          </p:cNvPr>
+          <p:cNvSpPr/>
+          <p:nvPr/>
+        </p:nvSpPr>
+        <p:spPr>
+          <a:xfrm>
+            <a:off x="383141" y="3013486"/>
+            <a:ext cx="3455434" cy="1343277"/>
+          </a:xfrm>
+          <a:prstGeom prst="roundRect">
+            <a:avLst/>
+          </a:prstGeom>
+          <a:noFill/>
+          <a:ln w="9525" cap="flat" cmpd="sng" algn="ctr">
+            <a:solidFill>
+              <a:schemeClr val="accent2"/>
+            </a:solidFill>
+            <a:prstDash val="solid"/>
+            <a:round/>
+            <a:headEnd type="none" w="med" len="med"/>
+            <a:tailEnd type="none" w="med" len="med"/>
+          </a:ln>
+        </p:spPr>
+        <p:style>
+          <a:lnRef idx="0">
+            <a:scrgbClr r="0" g="0" b="0"/>
+          </a:lnRef>
+          <a:fillRef idx="0">
+            <a:scrgbClr r="0" g="0" b="0"/>
+          </a:fillRef>
+          <a:effectRef idx="0">
+            <a:scrgbClr r="0" g="0" b="0"/>
+          </a:effectRef>
+          <a:fontRef idx="minor">
+            <a:schemeClr val="accent2"/>
+          </a:fontRef>
+        </p:style>
+        <p:txBody>
+          <a:bodyPr rtlCol="0" anchor="ctr"/>
+          <a:lstStyle/>
+          <a:p>
+            <a:pPr algn="ctr"/>
+            <a:endParaRPr lang="en-US"/>
+          </a:p>
+        </p:txBody>
+      </p:sp>
+      <p:sp>
+        <p:nvSpPr>
+          <p:cNvPr id="121" name="TextBox 120">
+            <a:extLst>
+              <a:ext uri="{FF2B5EF4-FFF2-40B4-BE49-F238E27FC236}">
+                <a16:creationId xmlns:a16="http://schemas.microsoft.com/office/drawing/2014/main" id="{F4F65514-F18D-FF5B-9A4F-06DFED2C072B}"/>
+              </a:ext>
+            </a:extLst>
+          </p:cNvPr>
+          <p:cNvSpPr txBox="1"/>
+          <p:nvPr/>
+        </p:nvSpPr>
+        <p:spPr>
+          <a:xfrm>
+            <a:off x="2905328" y="3002799"/>
+            <a:ext cx="666547" cy="369332"/>
+          </a:xfrm>
+          <a:prstGeom prst="rect">
+            <a:avLst/>
+          </a:prstGeom>
+          <a:noFill/>
+        </p:spPr>
+        <p:txBody>
+          <a:bodyPr wrap="square" rtlCol="0">
+            <a:spAutoFit/>
+          </a:bodyPr>
+          <a:lstStyle/>
+          <a:p>
+            <a:r>
+              <a:rPr lang="en-US" dirty="0">
+                <a:solidFill>
+                  <a:schemeClr val="accent2"/>
+                </a:solidFill>
+              </a:rPr>
+              <a:t>level</a:t>
+            </a:r>
+          </a:p>
+        </p:txBody>
+      </p:sp>
+      <p:sp>
+        <p:nvSpPr>
+          <p:cNvPr id="46" name="TextBox 45">
+            <a:extLst>
+              <a:ext uri="{FF2B5EF4-FFF2-40B4-BE49-F238E27FC236}">
+                <a16:creationId xmlns:a16="http://schemas.microsoft.com/office/drawing/2014/main" id="{FB3BD9A5-D116-D18C-FE23-BC6793413B5B}"/>
+              </a:ext>
+            </a:extLst>
+          </p:cNvPr>
+          <p:cNvSpPr txBox="1"/>
+          <p:nvPr/>
+        </p:nvSpPr>
+        <p:spPr>
+          <a:xfrm>
+            <a:off x="4695825" y="1562100"/>
+            <a:ext cx="6472156" cy="369332"/>
+          </a:xfrm>
+          <a:prstGeom prst="rect">
+            <a:avLst/>
+          </a:prstGeom>
+          <a:noFill/>
+        </p:spPr>
+        <p:txBody>
+          <a:bodyPr wrap="none" rtlCol="0">
+            <a:spAutoFit/>
+          </a:bodyPr>
+          <a:lstStyle/>
+          <a:p>
+            <a:r>
+              <a:rPr lang="en-US" dirty="0"/>
+              <a:t>Decoder section of autoencoder will be autoregressive transformer.</a:t>
+            </a:r>
+          </a:p>
+        </p:txBody>
+      </p:sp>
+      <p:sp>
+        <p:nvSpPr>
+          <p:cNvPr id="47" name="Oval 46">
+            <a:extLst>
+              <a:ext uri="{FF2B5EF4-FFF2-40B4-BE49-F238E27FC236}">
+                <a16:creationId xmlns:a16="http://schemas.microsoft.com/office/drawing/2014/main" id="{D07E618F-9233-C12F-88B8-B9E817F7BC6C}"/>
+              </a:ext>
+            </a:extLst>
+          </p:cNvPr>
+          <p:cNvSpPr/>
+          <p:nvPr/>
+        </p:nvSpPr>
+        <p:spPr>
+          <a:xfrm>
+            <a:off x="7019925" y="2273065"/>
+            <a:ext cx="1600202" cy="914400"/>
+          </a:xfrm>
+          <a:prstGeom prst="ellipse">
+            <a:avLst/>
+          </a:prstGeom>
+        </p:spPr>
+        <p:style>
+          <a:lnRef idx="2">
+            <a:schemeClr val="accent1">
+              <a:shade val="15000"/>
+            </a:schemeClr>
+          </a:lnRef>
+          <a:fillRef idx="1">
+            <a:schemeClr val="accent1"/>
+          </a:fillRef>
+          <a:effectRef idx="0">
+            <a:schemeClr val="accent1"/>
+          </a:effectRef>
+          <a:fontRef idx="minor">
+            <a:schemeClr val="lt1"/>
+          </a:fontRef>
+        </p:style>
+        <p:txBody>
+          <a:bodyPr rtlCol="0" anchor="ctr"/>
+          <a:lstStyle/>
+          <a:p>
+            <a:pPr algn="ctr"/>
+            <a:r>
+              <a:rPr lang="en-US" dirty="0"/>
+              <a:t>clustering node</a:t>
+            </a:r>
+          </a:p>
+        </p:txBody>
+      </p:sp>
+      <p:sp>
+        <p:nvSpPr>
+          <p:cNvPr id="48" name="Rectangle: Rounded Corners 47">
+            <a:extLst>
+              <a:ext uri="{FF2B5EF4-FFF2-40B4-BE49-F238E27FC236}">
+                <a16:creationId xmlns:a16="http://schemas.microsoft.com/office/drawing/2014/main" id="{65FE2CE2-2488-AA97-FC8A-A6AB9AE7FC20}"/>
+              </a:ext>
+            </a:extLst>
+          </p:cNvPr>
+          <p:cNvSpPr/>
+          <p:nvPr/>
+        </p:nvSpPr>
+        <p:spPr>
+          <a:xfrm>
+            <a:off x="7019925" y="3837905"/>
+            <a:ext cx="1600202" cy="369332"/>
+          </a:xfrm>
+          <a:prstGeom prst="roundRect">
+            <a:avLst/>
+          </a:prstGeom>
+        </p:spPr>
+        <p:style>
+          <a:lnRef idx="2">
+            <a:schemeClr val="accent1">
+              <a:shade val="15000"/>
+            </a:schemeClr>
+          </a:lnRef>
+          <a:fillRef idx="1">
+            <a:schemeClr val="accent1"/>
+          </a:fillRef>
+          <a:effectRef idx="0">
+            <a:schemeClr val="accent1"/>
+          </a:effectRef>
+          <a:fontRef idx="minor">
+            <a:schemeClr val="lt1"/>
+          </a:fontRef>
+        </p:style>
+        <p:txBody>
+          <a:bodyPr rtlCol="0" anchor="ctr"/>
+          <a:lstStyle/>
+          <a:p>
+            <a:pPr algn="ctr"/>
+            <a:r>
+              <a:rPr lang="en-US" dirty="0"/>
+              <a:t>XFMR Decoder</a:t>
+            </a:r>
+          </a:p>
+        </p:txBody>
+      </p:sp>
+      <p:cxnSp>
+        <p:nvCxnSpPr>
+          <p:cNvPr id="50" name="Straight Arrow Connector 49">
+            <a:extLst>
+              <a:ext uri="{FF2B5EF4-FFF2-40B4-BE49-F238E27FC236}">
+                <a16:creationId xmlns:a16="http://schemas.microsoft.com/office/drawing/2014/main" id="{7F07BB55-36D6-23F6-115B-CBD7EAC38F90}"/>
+              </a:ext>
+            </a:extLst>
+          </p:cNvPr>
+          <p:cNvCxnSpPr>
+            <a:cxnSpLocks/>
+            <a:stCxn id="47" idx="4"/>
+            <a:endCxn id="48" idx="0"/>
+          </p:cNvCxnSpPr>
+          <p:nvPr/>
+        </p:nvCxnSpPr>
+        <p:spPr>
+          <a:xfrm>
+            <a:off x="7820026" y="3187465"/>
+            <a:ext cx="0" cy="650440"/>
+          </a:xfrm>
+          <a:prstGeom prst="straightConnector1">
+            <a:avLst/>
+          </a:prstGeom>
+          <a:ln>
+            <a:tailEnd type="triangle"/>
+          </a:ln>
+        </p:spPr>
+        <p:style>
+          <a:lnRef idx="1">
+            <a:schemeClr val="accent1"/>
+          </a:lnRef>
+          <a:fillRef idx="0">
+            <a:schemeClr val="accent1"/>
+          </a:fillRef>
+          <a:effectRef idx="0">
+            <a:schemeClr val="accent1"/>
+          </a:effectRef>
+          <a:fontRef idx="minor">
+            <a:schemeClr val="tx1"/>
+          </a:fontRef>
+        </p:style>
+      </p:cxnSp>
+      <p:sp>
+        <p:nvSpPr>
+          <p:cNvPr id="51" name="TextBox 50">
+            <a:extLst>
+              <a:ext uri="{FF2B5EF4-FFF2-40B4-BE49-F238E27FC236}">
+                <a16:creationId xmlns:a16="http://schemas.microsoft.com/office/drawing/2014/main" id="{4842B7C8-F879-A340-6BDC-6183A6EEAC2F}"/>
+              </a:ext>
+            </a:extLst>
+          </p:cNvPr>
+          <p:cNvSpPr txBox="1"/>
+          <p:nvPr/>
+        </p:nvSpPr>
+        <p:spPr>
+          <a:xfrm>
+            <a:off x="7814411" y="3190258"/>
+            <a:ext cx="1286085" cy="523220"/>
+          </a:xfrm>
+          <a:prstGeom prst="rect">
+            <a:avLst/>
+          </a:prstGeom>
+          <a:noFill/>
+        </p:spPr>
+        <p:txBody>
+          <a:bodyPr wrap="square" rtlCol="0">
+            <a:spAutoFit/>
+          </a:bodyPr>
+          <a:lstStyle/>
+          <a:p>
+            <a:r>
+              <a:rPr lang="en-US" sz="1400" dirty="0" err="1"/>
+              <a:t>xfmr</a:t>
+            </a:r>
+            <a:r>
+              <a:rPr lang="en-US" sz="1400" dirty="0"/>
+              <a:t> context vector</a:t>
+            </a:r>
+          </a:p>
+        </p:txBody>
+      </p:sp>
+      <p:sp>
+        <p:nvSpPr>
+          <p:cNvPr id="58" name="Oval 57">
+            <a:extLst>
+              <a:ext uri="{FF2B5EF4-FFF2-40B4-BE49-F238E27FC236}">
+                <a16:creationId xmlns:a16="http://schemas.microsoft.com/office/drawing/2014/main" id="{0ACE10BF-4FD0-AF57-720E-E69BDB4015D9}"/>
+              </a:ext>
+            </a:extLst>
+          </p:cNvPr>
+          <p:cNvSpPr/>
+          <p:nvPr/>
+        </p:nvSpPr>
+        <p:spPr>
+          <a:xfrm>
+            <a:off x="4891244" y="3489363"/>
+            <a:ext cx="1580660" cy="1076320"/>
+          </a:xfrm>
+          <a:prstGeom prst="ellipse">
+            <a:avLst/>
+          </a:prstGeom>
+        </p:spPr>
+        <p:style>
+          <a:lnRef idx="2">
+            <a:schemeClr val="accent1">
+              <a:shade val="15000"/>
+            </a:schemeClr>
+          </a:lnRef>
+          <a:fillRef idx="1">
+            <a:schemeClr val="accent1"/>
+          </a:fillRef>
+          <a:effectRef idx="0">
+            <a:schemeClr val="accent1"/>
+          </a:effectRef>
+          <a:fontRef idx="minor">
+            <a:schemeClr val="lt1"/>
+          </a:fontRef>
+        </p:style>
+        <p:txBody>
+          <a:bodyPr rtlCol="0" anchor="ctr"/>
+          <a:lstStyle/>
+          <a:p>
+            <a:pPr algn="ctr"/>
+            <a:r>
+              <a:rPr lang="en-US" dirty="0" err="1"/>
+              <a:t>prev</a:t>
+            </a:r>
+            <a:r>
+              <a:rPr lang="en-US" dirty="0"/>
+              <a:t> predicted nodes</a:t>
+            </a:r>
+          </a:p>
+        </p:txBody>
+      </p:sp>
+      <p:cxnSp>
+        <p:nvCxnSpPr>
+          <p:cNvPr id="60" name="Straight Arrow Connector 59">
+            <a:extLst>
+              <a:ext uri="{FF2B5EF4-FFF2-40B4-BE49-F238E27FC236}">
+                <a16:creationId xmlns:a16="http://schemas.microsoft.com/office/drawing/2014/main" id="{68B3252B-F638-C80D-6A4C-36F15324E3AD}"/>
+              </a:ext>
+            </a:extLst>
+          </p:cNvPr>
+          <p:cNvCxnSpPr>
+            <a:stCxn id="58" idx="6"/>
+            <a:endCxn id="48" idx="1"/>
+          </p:cNvCxnSpPr>
+          <p:nvPr/>
+        </p:nvCxnSpPr>
+        <p:spPr>
+          <a:xfrm flipV="1">
+            <a:off x="6471904" y="4022571"/>
+            <a:ext cx="548021" cy="4952"/>
+          </a:xfrm>
+          <a:prstGeom prst="straightConnector1">
+            <a:avLst/>
+          </a:prstGeom>
+          <a:ln>
+            <a:tailEnd type="triangle"/>
+          </a:ln>
+        </p:spPr>
+        <p:style>
+          <a:lnRef idx="1">
+            <a:schemeClr val="accent1"/>
+          </a:lnRef>
+          <a:fillRef idx="0">
+            <a:schemeClr val="accent1"/>
+          </a:fillRef>
+          <a:effectRef idx="0">
+            <a:schemeClr val="accent1"/>
+          </a:effectRef>
+          <a:fontRef idx="minor">
+            <a:schemeClr val="tx1"/>
+          </a:fontRef>
+        </p:style>
+      </p:cxnSp>
+      <p:cxnSp>
+        <p:nvCxnSpPr>
+          <p:cNvPr id="64" name="Straight Arrow Connector 63">
+            <a:extLst>
+              <a:ext uri="{FF2B5EF4-FFF2-40B4-BE49-F238E27FC236}">
+                <a16:creationId xmlns:a16="http://schemas.microsoft.com/office/drawing/2014/main" id="{C9948262-C282-FE35-C513-EDE986A9751E}"/>
+              </a:ext>
+            </a:extLst>
+          </p:cNvPr>
+          <p:cNvCxnSpPr>
+            <a:cxnSpLocks/>
+            <a:stCxn id="48" idx="3"/>
+            <a:endCxn id="65" idx="1"/>
+          </p:cNvCxnSpPr>
+          <p:nvPr/>
+        </p:nvCxnSpPr>
+        <p:spPr>
+          <a:xfrm>
+            <a:off x="8620127" y="4022571"/>
+            <a:ext cx="548021" cy="530"/>
+          </a:xfrm>
+          <a:prstGeom prst="straightConnector1">
+            <a:avLst/>
+          </a:prstGeom>
+          <a:ln>
+            <a:tailEnd type="triangle"/>
+          </a:ln>
+        </p:spPr>
+        <p:style>
+          <a:lnRef idx="1">
+            <a:schemeClr val="accent1"/>
+          </a:lnRef>
+          <a:fillRef idx="0">
+            <a:schemeClr val="accent1"/>
+          </a:fillRef>
+          <a:effectRef idx="0">
+            <a:schemeClr val="accent1"/>
+          </a:effectRef>
+          <a:fontRef idx="minor">
+            <a:schemeClr val="tx1"/>
+          </a:fontRef>
+        </p:style>
+      </p:cxnSp>
+      <p:sp>
+        <p:nvSpPr>
+          <p:cNvPr id="65" name="TextBox 64">
+            <a:extLst>
+              <a:ext uri="{FF2B5EF4-FFF2-40B4-BE49-F238E27FC236}">
+                <a16:creationId xmlns:a16="http://schemas.microsoft.com/office/drawing/2014/main" id="{AA4E5289-F6ED-40BB-680F-AC6ED594E8A0}"/>
+              </a:ext>
+            </a:extLst>
+          </p:cNvPr>
+          <p:cNvSpPr txBox="1"/>
+          <p:nvPr/>
+        </p:nvSpPr>
+        <p:spPr>
+          <a:xfrm>
+            <a:off x="9168148" y="3838435"/>
+            <a:ext cx="2080762" cy="369332"/>
+          </a:xfrm>
+          <a:prstGeom prst="rect">
+            <a:avLst/>
+          </a:prstGeom>
+          <a:noFill/>
+        </p:spPr>
+        <p:txBody>
+          <a:bodyPr wrap="none" rtlCol="0">
+            <a:spAutoFit/>
+          </a:bodyPr>
+          <a:lstStyle/>
+          <a:p>
+            <a:r>
+              <a:rPr lang="en-US" dirty="0"/>
+              <a:t>next predicted node</a:t>
+            </a:r>
+          </a:p>
+        </p:txBody>
+      </p:sp>
+      <p:sp>
+        <p:nvSpPr>
+          <p:cNvPr id="69" name="TextBox 68">
+            <a:extLst>
+              <a:ext uri="{FF2B5EF4-FFF2-40B4-BE49-F238E27FC236}">
+                <a16:creationId xmlns:a16="http://schemas.microsoft.com/office/drawing/2014/main" id="{C2B79B27-DE29-8A05-2503-301BBB5D20BF}"/>
+              </a:ext>
+            </a:extLst>
+          </p:cNvPr>
+          <p:cNvSpPr txBox="1"/>
+          <p:nvPr/>
+        </p:nvSpPr>
+        <p:spPr>
+          <a:xfrm>
+            <a:off x="8439150" y="365125"/>
+            <a:ext cx="3024418" cy="369332"/>
+          </a:xfrm>
+          <a:prstGeom prst="rect">
+            <a:avLst/>
+          </a:prstGeom>
+          <a:noFill/>
+        </p:spPr>
+        <p:txBody>
+          <a:bodyPr wrap="none" rtlCol="0">
+            <a:spAutoFit/>
+          </a:bodyPr>
+          <a:lstStyle/>
+          <a:p>
+            <a:r>
+              <a:rPr lang="en-US" dirty="0">
+                <a:solidFill>
+                  <a:srgbClr val="FF0000"/>
+                </a:solidFill>
+              </a:rPr>
+              <a:t>Decodes a SUB-graph at time t</a:t>
             </a:r>
           </a:p>
         </p:txBody>
@@ -5124,7 +6582,111 @@
     </p:spTree>
     <p:extLst>
       <p:ext uri="{BB962C8B-B14F-4D97-AF65-F5344CB8AC3E}">
-        <p14:creationId xmlns:p14="http://schemas.microsoft.com/office/powerpoint/2010/main" val="1066989602"/>
+        <p14:creationId xmlns:p14="http://schemas.microsoft.com/office/powerpoint/2010/main" val="1241534727"/>
+      </p:ext>
+    </p:extLst>
+  </p:cSld>
+  <p:clrMapOvr>
+    <a:masterClrMapping/>
+  </p:clrMapOvr>
+</p:sld>
+</file>
+
+<file path=ppt/slides/slide3.xml><?xml version="1.0" encoding="utf-8"?>
+<p:sld xmlns:a="http://schemas.openxmlformats.org/drawingml/2006/main" xmlns:r="http://schemas.openxmlformats.org/officeDocument/2006/relationships" xmlns:p="http://schemas.openxmlformats.org/presentationml/2006/main">
+  <p:cSld>
+    <p:spTree>
+      <p:nvGrpSpPr>
+        <p:cNvPr id="1" name=""/>
+        <p:cNvGrpSpPr/>
+        <p:nvPr/>
+      </p:nvGrpSpPr>
+      <p:grpSpPr>
+        <a:xfrm>
+          <a:off x="0" y="0"/>
+          <a:ext cx="0" cy="0"/>
+          <a:chOff x="0" y="0"/>
+          <a:chExt cx="0" cy="0"/>
+        </a:xfrm>
+      </p:grpSpPr>
+      <p:sp>
+        <p:nvSpPr>
+          <p:cNvPr id="2" name="Title 1">
+            <a:extLst>
+              <a:ext uri="{FF2B5EF4-FFF2-40B4-BE49-F238E27FC236}">
+                <a16:creationId xmlns:a16="http://schemas.microsoft.com/office/drawing/2014/main" id="{CDEC47F0-D321-3F44-148E-E5B850BD2D46}"/>
+              </a:ext>
+            </a:extLst>
+          </p:cNvPr>
+          <p:cNvSpPr>
+            <a:spLocks noGrp="1"/>
+          </p:cNvSpPr>
+          <p:nvPr>
+            <p:ph type="title"/>
+          </p:nvPr>
+        </p:nvSpPr>
+        <p:spPr/>
+        <p:txBody>
+          <a:bodyPr/>
+          <a:lstStyle/>
+          <a:p>
+            <a:r>
+              <a:rPr lang="en-US" dirty="0"/>
+              <a:t>Handling Times Series</a:t>
+            </a:r>
+          </a:p>
+        </p:txBody>
+      </p:sp>
+      <p:sp>
+        <p:nvSpPr>
+          <p:cNvPr id="3" name="Content Placeholder 2">
+            <a:extLst>
+              <a:ext uri="{FF2B5EF4-FFF2-40B4-BE49-F238E27FC236}">
+                <a16:creationId xmlns:a16="http://schemas.microsoft.com/office/drawing/2014/main" id="{C592CB2B-0365-ABDE-3E8E-1BF520B891C2}"/>
+              </a:ext>
+            </a:extLst>
+          </p:cNvPr>
+          <p:cNvSpPr>
+            <a:spLocks noGrp="1"/>
+          </p:cNvSpPr>
+          <p:nvPr>
+            <p:ph idx="1"/>
+          </p:nvPr>
+        </p:nvSpPr>
+        <p:spPr/>
+        <p:txBody>
+          <a:bodyPr/>
+          <a:lstStyle/>
+          <a:p>
+            <a:r>
+              <a:rPr lang="en-US" dirty="0"/>
+              <a:t>For node containing sequences, encode each individual time step, maintaining embeddings for all nodes.  </a:t>
+            </a:r>
+          </a:p>
+          <a:p>
+            <a:r>
+              <a:rPr lang="en-US" dirty="0"/>
+              <a:t>Goal is to further encode all of the sequences of embeddings for each node into a single embedding at each node.  </a:t>
+            </a:r>
+          </a:p>
+          <a:p>
+            <a:r>
+              <a:rPr lang="en-US" dirty="0"/>
+              <a:t>The fully encoded root node then can be used in an autoencoder to reproduce the static graph (containing info of the underlying time series or other sequences)</a:t>
+            </a:r>
+          </a:p>
+          <a:p>
+            <a:r>
+              <a:rPr lang="en-US" dirty="0"/>
+              <a:t>Then each node can then be used to generate any sequences directly at the node without having to generate the entire sequence of graphs again.</a:t>
+            </a:r>
+          </a:p>
+        </p:txBody>
+      </p:sp>
+    </p:spTree>
+    <p:extLst>
+      <p:ext uri="{BB962C8B-B14F-4D97-AF65-F5344CB8AC3E}">
+        <p14:creationId xmlns:p14="http://schemas.microsoft.com/office/powerpoint/2010/main" val="3331254382"/>
       </p:ext>
     </p:extLst>
   </p:cSld>

</xml_diff>